<commit_message>
presentation and playtest results organized
</commit_message>
<xml_diff>
--- a/Presentations/MugShot Final Pitch.pptx
+++ b/Presentations/MugShot Final Pitch.pptx
@@ -8389,18 +8389,13 @@
           </a:p>
           <a:p>
             <a:r>
-              <a:rPr lang="en-GB">
+              <a:rPr lang="en-GB" dirty="0">
                 <a:solidFill>
                   <a:schemeClr val="tx1"/>
                 </a:solidFill>
               </a:rPr>
               <a:t>Playtest </a:t>
             </a:r>
-            <a:endParaRPr lang="en-GB" dirty="0">
-              <a:solidFill>
-                <a:schemeClr val="tx1"/>
-              </a:solidFill>
-            </a:endParaRPr>
           </a:p>
           <a:p>
             <a:endParaRPr lang="en-NL" dirty="0">

</xml_diff>

<commit_message>
updated presentation and cos calculation sheets
</commit_message>
<xml_diff>
--- a/Presentations/MugShot Final Pitch.pptx
+++ b/Presentations/MugShot Final Pitch.pptx
@@ -7,18 +7,17 @@
   <p:sldIdLst>
     <p:sldId id="256" r:id="rId2"/>
     <p:sldId id="257" r:id="rId3"/>
-    <p:sldId id="258" r:id="rId4"/>
-    <p:sldId id="259" r:id="rId5"/>
-    <p:sldId id="260" r:id="rId6"/>
-    <p:sldId id="261" r:id="rId7"/>
-    <p:sldId id="262" r:id="rId8"/>
-    <p:sldId id="263" r:id="rId9"/>
-    <p:sldId id="264" r:id="rId10"/>
-    <p:sldId id="265" r:id="rId11"/>
-    <p:sldId id="266" r:id="rId12"/>
-    <p:sldId id="267" r:id="rId13"/>
-    <p:sldId id="268" r:id="rId14"/>
-    <p:sldId id="269" r:id="rId15"/>
+    <p:sldId id="259" r:id="rId4"/>
+    <p:sldId id="260" r:id="rId5"/>
+    <p:sldId id="261" r:id="rId6"/>
+    <p:sldId id="262" r:id="rId7"/>
+    <p:sldId id="263" r:id="rId8"/>
+    <p:sldId id="264" r:id="rId9"/>
+    <p:sldId id="265" r:id="rId10"/>
+    <p:sldId id="266" r:id="rId11"/>
+    <p:sldId id="267" r:id="rId12"/>
+    <p:sldId id="268" r:id="rId13"/>
+    <p:sldId id="269" r:id="rId14"/>
   </p:sldIdLst>
   <p:sldSz cx="12192000" cy="6858000"/>
   <p:notesSz cx="6858000" cy="9144000"/>
@@ -311,7 +310,7 @@
             <a:fld id="{8E36636D-D922-432D-A958-524484B5923D}" type="datetimeFigureOut">
               <a:rPr lang="en-US" dirty="0"/>
               <a:pPr/>
-              <a:t>2/27/2019</a:t>
+              <a:t>2/28/2019</a:t>
             </a:fld>
             <a:endParaRPr lang="en-US" dirty="0"/>
           </a:p>
@@ -605,7 +604,7 @@
           <a:p>
             <a:fld id="{48A87A34-81AB-432B-8DAE-1953F412C126}" type="datetimeFigureOut">
               <a:rPr lang="en-US" dirty="0"/>
-              <a:t>2/27/2019</a:t>
+              <a:t>2/28/2019</a:t>
             </a:fld>
             <a:endParaRPr lang="en-US" dirty="0"/>
           </a:p>
@@ -792,7 +791,7 @@
           <a:p>
             <a:fld id="{48A87A34-81AB-432B-8DAE-1953F412C126}" type="datetimeFigureOut">
               <a:rPr lang="en-US" dirty="0"/>
-              <a:t>2/27/2019</a:t>
+              <a:t>2/28/2019</a:t>
             </a:fld>
             <a:endParaRPr lang="en-US" dirty="0"/>
           </a:p>
@@ -1048,7 +1047,7 @@
           <a:p>
             <a:fld id="{48A87A34-81AB-432B-8DAE-1953F412C126}" type="datetimeFigureOut">
               <a:rPr lang="en-US" dirty="0"/>
-              <a:t>2/27/2019</a:t>
+              <a:t>2/28/2019</a:t>
             </a:fld>
             <a:endParaRPr lang="en-US" dirty="0"/>
           </a:p>
@@ -1467,7 +1466,7 @@
           <a:p>
             <a:fld id="{48A87A34-81AB-432B-8DAE-1953F412C126}" type="datetimeFigureOut">
               <a:rPr lang="en-US" dirty="0"/>
-              <a:t>2/27/2019</a:t>
+              <a:t>2/28/2019</a:t>
             </a:fld>
             <a:endParaRPr lang="en-US" dirty="0"/>
           </a:p>
@@ -1999,7 +1998,7 @@
           <a:p>
             <a:fld id="{48A87A34-81AB-432B-8DAE-1953F412C126}" type="datetimeFigureOut">
               <a:rPr lang="en-US" dirty="0"/>
-              <a:t>2/27/2019</a:t>
+              <a:t>2/28/2019</a:t>
             </a:fld>
             <a:endParaRPr lang="en-US" dirty="0"/>
           </a:p>
@@ -2858,7 +2857,7 @@
           <a:p>
             <a:fld id="{48A87A34-81AB-432B-8DAE-1953F412C126}" type="datetimeFigureOut">
               <a:rPr lang="en-US" dirty="0"/>
-              <a:t>2/27/2019</a:t>
+              <a:t>2/28/2019</a:t>
             </a:fld>
             <a:endParaRPr lang="en-US" dirty="0"/>
           </a:p>
@@ -3024,7 +3023,7 @@
             <a:fld id="{8E36636D-D922-432D-A958-524484B5923D}" type="datetimeFigureOut">
               <a:rPr lang="en-US" dirty="0"/>
               <a:pPr/>
-              <a:t>2/27/2019</a:t>
+              <a:t>2/28/2019</a:t>
             </a:fld>
             <a:endParaRPr lang="en-US" dirty="0"/>
           </a:p>
@@ -3205,7 +3204,7 @@
             <a:fld id="{8E36636D-D922-432D-A958-524484B5923D}" type="datetimeFigureOut">
               <a:rPr lang="en-US" dirty="0"/>
               <a:pPr/>
-              <a:t>2/27/2019</a:t>
+              <a:t>2/28/2019</a:t>
             </a:fld>
             <a:endParaRPr lang="en-US" dirty="0"/>
           </a:p>
@@ -3372,7 +3371,7 @@
             <a:fld id="{8E36636D-D922-432D-A958-524484B5923D}" type="datetimeFigureOut">
               <a:rPr lang="en-US" dirty="0"/>
               <a:pPr/>
-              <a:t>2/27/2019</a:t>
+              <a:t>2/28/2019</a:t>
             </a:fld>
             <a:endParaRPr lang="en-US" dirty="0"/>
           </a:p>
@@ -3613,7 +3612,7 @@
             <a:fld id="{8E36636D-D922-432D-A958-524484B5923D}" type="datetimeFigureOut">
               <a:rPr lang="en-US" dirty="0"/>
               <a:pPr/>
-              <a:t>2/27/2019</a:t>
+              <a:t>2/28/2019</a:t>
             </a:fld>
             <a:endParaRPr lang="en-US" dirty="0"/>
           </a:p>
@@ -3846,7 +3845,7 @@
             <a:fld id="{8E36636D-D922-432D-A958-524484B5923D}" type="datetimeFigureOut">
               <a:rPr lang="en-US" dirty="0"/>
               <a:pPr/>
-              <a:t>2/27/2019</a:t>
+              <a:t>2/28/2019</a:t>
             </a:fld>
             <a:endParaRPr lang="en-US" dirty="0"/>
           </a:p>
@@ -4309,7 +4308,7 @@
             <a:fld id="{8E36636D-D922-432D-A958-524484B5923D}" type="datetimeFigureOut">
               <a:rPr lang="en-US" dirty="0"/>
               <a:pPr/>
-              <a:t>2/27/2019</a:t>
+              <a:t>2/28/2019</a:t>
             </a:fld>
             <a:endParaRPr lang="en-US" dirty="0"/>
           </a:p>
@@ -4424,7 +4423,7 @@
             <a:fld id="{8E36636D-D922-432D-A958-524484B5923D}" type="datetimeFigureOut">
               <a:rPr lang="en-US" dirty="0"/>
               <a:pPr/>
-              <a:t>2/27/2019</a:t>
+              <a:t>2/28/2019</a:t>
             </a:fld>
             <a:endParaRPr lang="en-US" dirty="0"/>
           </a:p>
@@ -4516,7 +4515,7 @@
             <a:fld id="{8E36636D-D922-432D-A958-524484B5923D}" type="datetimeFigureOut">
               <a:rPr lang="en-US" dirty="0"/>
               <a:pPr/>
-              <a:t>2/27/2019</a:t>
+              <a:t>2/28/2019</a:t>
             </a:fld>
             <a:endParaRPr lang="en-US" dirty="0"/>
           </a:p>
@@ -4768,7 +4767,7 @@
             <a:fld id="{8E36636D-D922-432D-A958-524484B5923D}" type="datetimeFigureOut">
               <a:rPr lang="en-US" dirty="0"/>
               <a:pPr/>
-              <a:t>2/27/2019</a:t>
+              <a:t>2/28/2019</a:t>
             </a:fld>
             <a:endParaRPr lang="en-US" dirty="0"/>
           </a:p>
@@ -5065,7 +5064,7 @@
             <a:fld id="{8E36636D-D922-432D-A958-524484B5923D}" type="datetimeFigureOut">
               <a:rPr lang="en-US" dirty="0"/>
               <a:pPr/>
-              <a:t>2/27/2019</a:t>
+              <a:t>2/28/2019</a:t>
             </a:fld>
             <a:endParaRPr lang="en-US" dirty="0"/>
           </a:p>
@@ -5296,7 +5295,7 @@
             <a:fld id="{8E36636D-D922-432D-A958-524484B5923D}" type="datetimeFigureOut">
               <a:rPr lang="en-US" dirty="0"/>
               <a:pPr/>
-              <a:t>2/27/2019</a:t>
+              <a:t>2/28/2019</a:t>
             </a:fld>
             <a:endParaRPr lang="en-US" dirty="0"/>
           </a:p>
@@ -6148,10 +6147,10 @@
       </p:grpSpPr>
       <p:sp useBgFill="1">
         <p:nvSpPr>
-          <p:cNvPr id="21" name="Rectangle 14">
+          <p:cNvPr id="8" name="Rectangle 7">
             <a:extLst>
               <a:ext uri="{FF2B5EF4-FFF2-40B4-BE49-F238E27FC236}">
-                <a16:creationId xmlns:a16="http://schemas.microsoft.com/office/drawing/2014/main" id="{9A6C2C86-63BF-47D5-AA3F-905111A238E2}"/>
+                <a16:creationId xmlns:a16="http://schemas.microsoft.com/office/drawing/2014/main" id="{69652D62-ECFB-408E-ABE6-155A644F433D}"/>
               </a:ext>
               <a:ext uri="{C183D7F6-B498-43B3-948B-1728B52AA6E4}">
                 <adec:decorative xmlns:adec="http://schemas.microsoft.com/office/drawing/2017/decorative" val="1"/>
@@ -6208,10 +6207,83 @@
       </p:sp>
       <p:sp>
         <p:nvSpPr>
+          <p:cNvPr id="10" name="Rectangle 9">
+            <a:extLst>
+              <a:ext uri="{FF2B5EF4-FFF2-40B4-BE49-F238E27FC236}">
+                <a16:creationId xmlns:a16="http://schemas.microsoft.com/office/drawing/2014/main" id="{C1FEA985-924B-4044-8778-32D1E7164C01}"/>
+              </a:ext>
+              <a:ext uri="{C183D7F6-B498-43B3-948B-1728B52AA6E4}">
+                <adec:decorative xmlns:adec="http://schemas.microsoft.com/office/drawing/2017/decorative" val="1"/>
+              </a:ext>
+            </a:extLst>
+          </p:cNvPr>
+          <p:cNvSpPr>
+            <a:spLocks noGrp="1" noRot="1" noChangeAspect="1" noMove="1" noResize="1" noEditPoints="1" noAdjustHandles="1" noChangeArrowheads="1" noChangeShapeType="1" noTextEdit="1"/>
+          </p:cNvSpPr>
+          <p:nvPr>
+            <p:extLst>
+              <p:ext uri="{386F3935-93C4-4BCD-93E2-E3B085C9AB24}">
+                <p16:designElem xmlns:p16="http://schemas.microsoft.com/office/powerpoint/2015/main" val="1"/>
+              </p:ext>
+            </p:extLst>
+          </p:nvPr>
+        </p:nvSpPr>
+        <p:spPr bwMode="ltGray">
+          <a:xfrm>
+            <a:off x="321564" y="320040"/>
+            <a:ext cx="11548872" cy="6217920"/>
+          </a:xfrm>
+          <a:prstGeom prst="rect">
+            <a:avLst/>
+          </a:prstGeom>
+          <a:solidFill>
+            <a:schemeClr val="bg1">
+              <a:lumMod val="75000"/>
+              <a:lumOff val="25000"/>
+            </a:schemeClr>
+          </a:solidFill>
+          <a:ln>
+            <a:noFill/>
+          </a:ln>
+          <a:effectLst>
+            <a:innerShdw blurRad="63500" dist="50800" dir="16200000">
+              <a:prstClr val="black">
+                <a:alpha val="50000"/>
+              </a:prstClr>
+            </a:innerShdw>
+          </a:effectLst>
+        </p:spPr>
+        <p:style>
+          <a:lnRef idx="2">
+            <a:schemeClr val="accent1">
+              <a:shade val="50000"/>
+            </a:schemeClr>
+          </a:lnRef>
+          <a:fillRef idx="1">
+            <a:schemeClr val="accent1"/>
+          </a:fillRef>
+          <a:effectRef idx="0">
+            <a:schemeClr val="accent1"/>
+          </a:effectRef>
+          <a:fontRef idx="minor">
+            <a:schemeClr val="lt1"/>
+          </a:fontRef>
+        </p:style>
+        <p:txBody>
+          <a:bodyPr rtlCol="0" anchor="ctr"/>
+          <a:lstStyle/>
+          <a:p>
+            <a:pPr algn="ctr"/>
+            <a:endParaRPr lang="en-US"/>
+          </a:p>
+        </p:txBody>
+      </p:sp>
+      <p:sp>
+        <p:nvSpPr>
           <p:cNvPr id="2" name="Titel 1">
             <a:extLst>
               <a:ext uri="{FF2B5EF4-FFF2-40B4-BE49-F238E27FC236}">
-                <a16:creationId xmlns:a16="http://schemas.microsoft.com/office/drawing/2014/main" id="{58F2CC8E-F80D-4F37-8B5D-144FB99CF183}"/>
+                <a16:creationId xmlns:a16="http://schemas.microsoft.com/office/drawing/2014/main" id="{9EE616A2-3362-4BF9-850D-8AD89A70567A}"/>
               </a:ext>
             </a:extLst>
           </p:cNvPr>
@@ -6224,8 +6296,8 @@
         </p:nvSpPr>
         <p:spPr>
           <a:xfrm>
-            <a:off x="834013" y="1115568"/>
-            <a:ext cx="3487616" cy="4626864"/>
+            <a:off x="913795" y="963506"/>
+            <a:ext cx="3740815" cy="4827693"/>
           </a:xfrm>
         </p:spPr>
         <p:txBody>
@@ -6234,21 +6306,21 @@
           </a:bodyPr>
           <a:lstStyle/>
           <a:p>
-            <a:pPr algn="l"/>
-            <a:r>
-              <a:rPr lang="en-GB" sz="3600"/>
-              <a:t>Rick Oosthof </a:t>
-            </a:r>
-            <a:endParaRPr lang="en-NL" sz="3600"/>
+            <a:pPr algn="r"/>
+            <a:r>
+              <a:rPr lang="en-GB" dirty="0"/>
+              <a:t>Rob O’Connor</a:t>
+            </a:r>
+            <a:endParaRPr lang="en-NL"/>
           </a:p>
         </p:txBody>
       </p:sp>
       <p:cxnSp>
         <p:nvCxnSpPr>
-          <p:cNvPr id="22" name="Straight Connector 16">
+          <p:cNvPr id="12" name="Straight Connector 11">
             <a:extLst>
               <a:ext uri="{FF2B5EF4-FFF2-40B4-BE49-F238E27FC236}">
-                <a16:creationId xmlns:a16="http://schemas.microsoft.com/office/drawing/2014/main" id="{425A0768-3044-4AA9-A889-D2CAA68C517A}"/>
+                <a16:creationId xmlns:a16="http://schemas.microsoft.com/office/drawing/2014/main" id="{96C7F9CB-BCC3-4648-8DEF-07B0887D87D6}"/>
               </a:ext>
               <a:ext uri="{C183D7F6-B498-43B3-948B-1728B52AA6E4}">
                 <adec:decorative xmlns:adec="http://schemas.microsoft.com/office/drawing/2017/decorative" val="1"/>
@@ -6268,7 +6340,7 @@
         </p:nvCxnSpPr>
         <p:spPr>
           <a:xfrm>
-            <a:off x="4654605" y="2057400"/>
+            <a:off x="4981187" y="2057399"/>
             <a:ext cx="0" cy="2743200"/>
           </a:xfrm>
           <a:prstGeom prst="line">
@@ -6276,7 +6348,7 @@
           </a:prstGeom>
           <a:ln w="19050">
             <a:solidFill>
-              <a:schemeClr val="tx2"/>
+              <a:schemeClr val="accent1"/>
             </a:solidFill>
           </a:ln>
         </p:spPr>
@@ -6300,7 +6372,7 @@
           <p:cNvPr id="3" name="Tijdelijke aanduiding voor inhoud 2">
             <a:extLst>
               <a:ext uri="{FF2B5EF4-FFF2-40B4-BE49-F238E27FC236}">
-                <a16:creationId xmlns:a16="http://schemas.microsoft.com/office/drawing/2014/main" id="{A59640DC-A8D9-4832-AA85-FA00A2BA4ADB}"/>
+                <a16:creationId xmlns:a16="http://schemas.microsoft.com/office/drawing/2014/main" id="{F4D083EA-F002-4683-A212-5697CD9E8C2E}"/>
               </a:ext>
             </a:extLst>
           </p:cNvPr>
@@ -6313,9 +6385,10 @@
         </p:nvSpPr>
         <p:spPr>
           <a:xfrm>
-            <a:off x="5105398" y="1115568"/>
-            <a:ext cx="6245352" cy="4626864"/>
-          </a:xfrm>
+            <a:off x="5307765" y="963507"/>
+            <a:ext cx="5959791" cy="4827694"/>
+          </a:xfrm>
+          <a:effectLst/>
         </p:spPr>
         <p:txBody>
           <a:bodyPr anchor="ctr">
@@ -6324,25 +6397,67 @@
           <a:lstStyle/>
           <a:p>
             <a:r>
-              <a:rPr lang="en-GB"/>
-              <a:t>Create the controller</a:t>
-            </a:r>
-          </a:p>
-          <a:p>
-            <a:r>
-              <a:rPr lang="en-GB"/>
-              <a:t>Level Design</a:t>
-            </a:r>
-          </a:p>
-          <a:p>
-            <a:endParaRPr lang="en-NL" dirty="0"/>
+              <a:rPr lang="en-GB" dirty="0">
+                <a:solidFill>
+                  <a:schemeClr val="tx1"/>
+                </a:solidFill>
+              </a:rPr>
+              <a:t>Art stuff</a:t>
+            </a:r>
+          </a:p>
+          <a:p>
+            <a:r>
+              <a:rPr lang="en-GB" dirty="0">
+                <a:solidFill>
+                  <a:schemeClr val="tx1"/>
+                </a:solidFill>
+              </a:rPr>
+              <a:t>Filming and editing the trailer</a:t>
+            </a:r>
+          </a:p>
+          <a:p>
+            <a:r>
+              <a:rPr lang="en-GB" dirty="0">
+                <a:solidFill>
+                  <a:schemeClr val="tx1"/>
+                </a:solidFill>
+              </a:rPr>
+              <a:t>Scrum Master</a:t>
+            </a:r>
+          </a:p>
+          <a:p>
+            <a:r>
+              <a:rPr lang="en-GB" dirty="0">
+                <a:solidFill>
+                  <a:schemeClr val="tx1"/>
+                </a:solidFill>
+              </a:rPr>
+              <a:t>Animation</a:t>
+            </a:r>
+          </a:p>
+          <a:p>
+            <a:r>
+              <a:rPr lang="en-GB" dirty="0">
+                <a:solidFill>
+                  <a:schemeClr val="tx1"/>
+                </a:solidFill>
+              </a:rPr>
+              <a:t>Pictures</a:t>
+            </a:r>
+          </a:p>
+          <a:p>
+            <a:endParaRPr lang="en-NL" dirty="0">
+              <a:solidFill>
+                <a:schemeClr val="tx1"/>
+              </a:solidFill>
+            </a:endParaRPr>
           </a:p>
         </p:txBody>
       </p:sp>
     </p:spTree>
     <p:extLst>
       <p:ext uri="{BB962C8B-B14F-4D97-AF65-F5344CB8AC3E}">
-        <p14:creationId xmlns:p14="http://schemas.microsoft.com/office/powerpoint/2010/main" val="852613690"/>
+        <p14:creationId xmlns:p14="http://schemas.microsoft.com/office/powerpoint/2010/main" val="2107328230"/>
       </p:ext>
     </p:extLst>
   </p:cSld>
@@ -6394,7 +6509,7 @@
           <p:cNvPr id="8" name="Rectangle 7">
             <a:extLst>
               <a:ext uri="{FF2B5EF4-FFF2-40B4-BE49-F238E27FC236}">
-                <a16:creationId xmlns:a16="http://schemas.microsoft.com/office/drawing/2014/main" id="{69652D62-ECFB-408E-ABE6-155A644F433D}"/>
+                <a16:creationId xmlns:a16="http://schemas.microsoft.com/office/drawing/2014/main" id="{9A6C2C86-63BF-47D5-AA3F-905111A238E2}"/>
               </a:ext>
               <a:ext uri="{C183D7F6-B498-43B3-948B-1728B52AA6E4}">
                 <adec:decorative xmlns:adec="http://schemas.microsoft.com/office/drawing/2017/decorative" val="1"/>
@@ -6451,19 +6566,56 @@
       </p:sp>
       <p:sp>
         <p:nvSpPr>
-          <p:cNvPr id="10" name="Rectangle 9">
+          <p:cNvPr id="2" name="Titel 1">
             <a:extLst>
               <a:ext uri="{FF2B5EF4-FFF2-40B4-BE49-F238E27FC236}">
-                <a16:creationId xmlns:a16="http://schemas.microsoft.com/office/drawing/2014/main" id="{C1FEA985-924B-4044-8778-32D1E7164C01}"/>
+                <a16:creationId xmlns:a16="http://schemas.microsoft.com/office/drawing/2014/main" id="{A4AA4E2F-F350-418E-81E7-93B92EEB49D7}"/>
+              </a:ext>
+            </a:extLst>
+          </p:cNvPr>
+          <p:cNvSpPr>
+            <a:spLocks noGrp="1"/>
+          </p:cNvSpPr>
+          <p:nvPr>
+            <p:ph type="title"/>
+          </p:nvPr>
+        </p:nvSpPr>
+        <p:spPr>
+          <a:xfrm>
+            <a:off x="834013" y="1115568"/>
+            <a:ext cx="3487616" cy="4626864"/>
+          </a:xfrm>
+        </p:spPr>
+        <p:txBody>
+          <a:bodyPr>
+            <a:normAutofit/>
+          </a:bodyPr>
+          <a:lstStyle/>
+          <a:p>
+            <a:pPr algn="l"/>
+            <a:r>
+              <a:rPr lang="en-GB" sz="3600"/>
+              <a:t>Georgi Statev</a:t>
+            </a:r>
+            <a:endParaRPr lang="en-NL" sz="3600"/>
+          </a:p>
+        </p:txBody>
+      </p:sp>
+      <p:cxnSp>
+        <p:nvCxnSpPr>
+          <p:cNvPr id="10" name="Straight Connector 9">
+            <a:extLst>
+              <a:ext uri="{FF2B5EF4-FFF2-40B4-BE49-F238E27FC236}">
+                <a16:creationId xmlns:a16="http://schemas.microsoft.com/office/drawing/2014/main" id="{425A0768-3044-4AA9-A889-D2CAA68C517A}"/>
               </a:ext>
               <a:ext uri="{C183D7F6-B498-43B3-948B-1728B52AA6E4}">
                 <adec:decorative xmlns:adec="http://schemas.microsoft.com/office/drawing/2017/decorative" val="1"/>
               </a:ext>
             </a:extLst>
           </p:cNvPr>
-          <p:cNvSpPr>
-            <a:spLocks noGrp="1" noRot="1" noChangeAspect="1" noMove="1" noResize="1" noEditPoints="1" noAdjustHandles="1" noChangeArrowheads="1" noChangeShapeType="1" noTextEdit="1"/>
-          </p:cNvSpPr>
+          <p:cNvCxnSpPr>
+            <a:cxnSpLocks noGrp="1" noRot="1" noChangeAspect="1" noMove="1" noResize="1" noEditPoints="1" noAdjustHandles="1" noChangeArrowheads="1" noChangeShapeType="1"/>
+          </p:cNvCxnSpPr>
           <p:nvPr>
             <p:extLst>
               <p:ext uri="{386F3935-93C4-4BCD-93E2-E3B085C9AB24}">
@@ -6471,31 +6623,342 @@
               </p:ext>
             </p:extLst>
           </p:nvPr>
-        </p:nvSpPr>
-        <p:spPr bwMode="ltGray">
-          <a:xfrm>
-            <a:off x="321564" y="320040"/>
-            <a:ext cx="11548872" cy="6217920"/>
+        </p:nvCxnSpPr>
+        <p:spPr>
+          <a:xfrm>
+            <a:off x="4654605" y="2057400"/>
+            <a:ext cx="0" cy="2743200"/>
+          </a:xfrm>
+          <a:prstGeom prst="line">
+            <a:avLst/>
+          </a:prstGeom>
+          <a:ln w="19050">
+            <a:solidFill>
+              <a:schemeClr val="tx2"/>
+            </a:solidFill>
+          </a:ln>
+        </p:spPr>
+        <p:style>
+          <a:lnRef idx="1">
+            <a:schemeClr val="accent1"/>
+          </a:lnRef>
+          <a:fillRef idx="0">
+            <a:schemeClr val="accent1"/>
+          </a:fillRef>
+          <a:effectRef idx="0">
+            <a:schemeClr val="accent1"/>
+          </a:effectRef>
+          <a:fontRef idx="minor">
+            <a:schemeClr val="tx1"/>
+          </a:fontRef>
+        </p:style>
+      </p:cxnSp>
+      <p:sp>
+        <p:nvSpPr>
+          <p:cNvPr id="3" name="Tijdelijke aanduiding voor inhoud 2">
+            <a:extLst>
+              <a:ext uri="{FF2B5EF4-FFF2-40B4-BE49-F238E27FC236}">
+                <a16:creationId xmlns:a16="http://schemas.microsoft.com/office/drawing/2014/main" id="{7E3A0AE5-A26F-4077-9A96-1D5A245EED7A}"/>
+              </a:ext>
+            </a:extLst>
+          </p:cNvPr>
+          <p:cNvSpPr>
+            <a:spLocks noGrp="1"/>
+          </p:cNvSpPr>
+          <p:nvPr>
+            <p:ph idx="1"/>
+          </p:nvPr>
+        </p:nvSpPr>
+        <p:spPr>
+          <a:xfrm>
+            <a:off x="5105398" y="1115568"/>
+            <a:ext cx="6245352" cy="4626864"/>
+          </a:xfrm>
+        </p:spPr>
+        <p:txBody>
+          <a:bodyPr anchor="ctr">
+            <a:normAutofit/>
+          </a:bodyPr>
+          <a:lstStyle/>
+          <a:p>
+            <a:r>
+              <a:rPr lang="en-GB" dirty="0"/>
+              <a:t>Art stuff</a:t>
+            </a:r>
+          </a:p>
+          <a:p>
+            <a:r>
+              <a:rPr lang="en-GB" dirty="0" err="1"/>
+              <a:t>Tilesheets</a:t>
+            </a:r>
+            <a:endParaRPr lang="en-GB" dirty="0"/>
+          </a:p>
+          <a:p>
+            <a:r>
+              <a:rPr lang="en-GB" dirty="0"/>
+              <a:t>Animation</a:t>
+            </a:r>
+          </a:p>
+          <a:p>
+            <a:r>
+              <a:rPr lang="en-GB" dirty="0"/>
+              <a:t>Poster</a:t>
+            </a:r>
+            <a:endParaRPr lang="en-NL" dirty="0"/>
+          </a:p>
+        </p:txBody>
+      </p:sp>
+    </p:spTree>
+    <p:extLst>
+      <p:ext uri="{BB962C8B-B14F-4D97-AF65-F5344CB8AC3E}">
+        <p14:creationId xmlns:p14="http://schemas.microsoft.com/office/powerpoint/2010/main" val="1654114158"/>
+      </p:ext>
+    </p:extLst>
+  </p:cSld>
+  <p:clrMapOvr>
+    <a:masterClrMapping/>
+  </p:clrMapOvr>
+</p:sld>
+</file>
+
+<file path=ppt/slides/slide12.xml><?xml version="1.0" encoding="utf-8"?>
+<p:sld xmlns:a="http://schemas.openxmlformats.org/drawingml/2006/main" xmlns:r="http://schemas.openxmlformats.org/officeDocument/2006/relationships" xmlns:p="http://schemas.openxmlformats.org/presentationml/2006/main">
+  <p:cSld>
+    <p:spTree>
+      <p:nvGrpSpPr>
+        <p:cNvPr id="1" name=""/>
+        <p:cNvGrpSpPr/>
+        <p:nvPr/>
+      </p:nvGrpSpPr>
+      <p:grpSpPr>
+        <a:xfrm>
+          <a:off x="0" y="0"/>
+          <a:ext cx="0" cy="0"/>
+          <a:chOff x="0" y="0"/>
+          <a:chExt cx="0" cy="0"/>
+        </a:xfrm>
+      </p:grpSpPr>
+      <p:sp>
+        <p:nvSpPr>
+          <p:cNvPr id="2" name="Titel 1">
+            <a:extLst>
+              <a:ext uri="{FF2B5EF4-FFF2-40B4-BE49-F238E27FC236}">
+                <a16:creationId xmlns:a16="http://schemas.microsoft.com/office/drawing/2014/main" id="{1EB59341-CA71-45AD-9110-D77D62267ADF}"/>
+              </a:ext>
+            </a:extLst>
+          </p:cNvPr>
+          <p:cNvSpPr>
+            <a:spLocks noGrp="1"/>
+          </p:cNvSpPr>
+          <p:nvPr>
+            <p:ph type="title"/>
+          </p:nvPr>
+        </p:nvSpPr>
+        <p:spPr/>
+        <p:txBody>
+          <a:bodyPr>
+            <a:normAutofit/>
+          </a:bodyPr>
+          <a:lstStyle/>
+          <a:p>
+            <a:r>
+              <a:rPr lang="en-GB" dirty="0"/>
+              <a:t>Teamwork</a:t>
+            </a:r>
+            <a:endParaRPr lang="en-NL" dirty="0"/>
+          </a:p>
+        </p:txBody>
+      </p:sp>
+      <p:sp>
+        <p:nvSpPr>
+          <p:cNvPr id="3" name="Tijdelijke aanduiding voor inhoud 2">
+            <a:extLst>
+              <a:ext uri="{FF2B5EF4-FFF2-40B4-BE49-F238E27FC236}">
+                <a16:creationId xmlns:a16="http://schemas.microsoft.com/office/drawing/2014/main" id="{2EA55C4F-101C-4784-9271-4526962ABE7D}"/>
+              </a:ext>
+            </a:extLst>
+          </p:cNvPr>
+          <p:cNvSpPr>
+            <a:spLocks noGrp="1"/>
+          </p:cNvSpPr>
+          <p:nvPr>
+            <p:ph idx="1"/>
+          </p:nvPr>
+        </p:nvSpPr>
+        <p:spPr/>
+        <p:txBody>
+          <a:bodyPr/>
+          <a:lstStyle/>
+          <a:p>
+            <a:r>
+              <a:rPr lang="en-GB" dirty="0"/>
+              <a:t>Reflection</a:t>
+            </a:r>
+          </a:p>
+          <a:p>
+            <a:endParaRPr lang="en-GB" dirty="0"/>
+          </a:p>
+          <a:p>
+            <a:r>
+              <a:rPr lang="en-GB" dirty="0"/>
+              <a:t>Communication could be better</a:t>
+            </a:r>
+          </a:p>
+          <a:p>
+            <a:endParaRPr lang="en-GB" dirty="0"/>
+          </a:p>
+          <a:p>
+            <a:r>
+              <a:rPr lang="en-GB" dirty="0"/>
+              <a:t>Be at school on time</a:t>
+            </a:r>
+          </a:p>
+          <a:p>
+            <a:endParaRPr lang="en-GB" dirty="0"/>
+          </a:p>
+          <a:p>
+            <a:r>
+              <a:rPr lang="en-GB" dirty="0"/>
+              <a:t>Peer assessment</a:t>
+            </a:r>
+          </a:p>
+          <a:p>
+            <a:endParaRPr lang="en-GB" dirty="0"/>
+          </a:p>
+          <a:p>
+            <a:r>
+              <a:rPr lang="en-GB" dirty="0"/>
+              <a:t>Roles (examples)</a:t>
+            </a:r>
+          </a:p>
+        </p:txBody>
+      </p:sp>
+    </p:spTree>
+    <p:extLst>
+      <p:ext uri="{BB962C8B-B14F-4D97-AF65-F5344CB8AC3E}">
+        <p14:creationId xmlns:p14="http://schemas.microsoft.com/office/powerpoint/2010/main" val="248716324"/>
+      </p:ext>
+    </p:extLst>
+  </p:cSld>
+  <p:clrMapOvr>
+    <a:masterClrMapping/>
+  </p:clrMapOvr>
+</p:sld>
+</file>
+
+<file path=ppt/slides/slide13.xml><?xml version="1.0" encoding="utf-8"?>
+<p:sld xmlns:a="http://schemas.openxmlformats.org/drawingml/2006/main" xmlns:r="http://schemas.openxmlformats.org/officeDocument/2006/relationships" xmlns:p="http://schemas.openxmlformats.org/presentationml/2006/main">
+  <p:cSld>
+    <p:bg>
+      <p:bgPr>
+        <a:blipFill rotWithShape="1">
+          <a:blip r:embed="rId2">
+            <a:duotone>
+              <a:schemeClr val="bg2">
+                <a:shade val="80000"/>
+                <a:lumMod val="80000"/>
+              </a:schemeClr>
+              <a:schemeClr val="bg2">
+                <a:tint val="98000"/>
+              </a:schemeClr>
+            </a:duotone>
+            <a:extLst/>
+          </a:blip>
+          <a:stretch/>
+        </a:blipFill>
+        <a:effectLst/>
+      </p:bgPr>
+    </p:bg>
+    <p:spTree>
+      <p:nvGrpSpPr>
+        <p:cNvPr id="1" name=""/>
+        <p:cNvGrpSpPr/>
+        <p:nvPr/>
+      </p:nvGrpSpPr>
+      <p:grpSpPr>
+        <a:xfrm>
+          <a:off x="0" y="0"/>
+          <a:ext cx="0" cy="0"/>
+          <a:chOff x="0" y="0"/>
+          <a:chExt cx="0" cy="0"/>
+        </a:xfrm>
+      </p:grpSpPr>
+      <p:sp>
+        <p:nvSpPr>
+          <p:cNvPr id="2" name="Titel 1">
+            <a:extLst>
+              <a:ext uri="{FF2B5EF4-FFF2-40B4-BE49-F238E27FC236}">
+                <a16:creationId xmlns:a16="http://schemas.microsoft.com/office/drawing/2014/main" id="{8C793FC3-5889-46EE-A3DA-6AF18CCEAE31}"/>
+              </a:ext>
+            </a:extLst>
+          </p:cNvPr>
+          <p:cNvSpPr>
+            <a:spLocks noGrp="1"/>
+          </p:cNvSpPr>
+          <p:nvPr>
+            <p:ph type="title"/>
+          </p:nvPr>
+        </p:nvSpPr>
+        <p:spPr>
+          <a:xfrm>
+            <a:off x="8094617" y="965196"/>
+            <a:ext cx="3137262" cy="2633146"/>
+          </a:xfrm>
+        </p:spPr>
+        <p:txBody>
+          <a:bodyPr vert="horz" lIns="91440" tIns="45720" rIns="91440" bIns="45720" rtlCol="0" anchor="b">
+            <a:normAutofit/>
+          </a:bodyPr>
+          <a:lstStyle/>
+          <a:p>
+            <a:r>
+              <a:rPr lang="en-US"/>
+              <a:t>Questions?</a:t>
+            </a:r>
+          </a:p>
+        </p:txBody>
+      </p:sp>
+      <p:sp>
+        <p:nvSpPr>
+          <p:cNvPr id="80" name="Rectangle 79">
+            <a:extLst>
+              <a:ext uri="{FF2B5EF4-FFF2-40B4-BE49-F238E27FC236}">
+                <a16:creationId xmlns:a16="http://schemas.microsoft.com/office/drawing/2014/main" id="{93A46EEB-10AB-4E52-AF22-A848AE9259F9}"/>
+              </a:ext>
+              <a:ext uri="{C183D7F6-B498-43B3-948B-1728B52AA6E4}">
+                <adec:decorative xmlns:adec="http://schemas.microsoft.com/office/drawing/2017/decorative" val="1"/>
+              </a:ext>
+            </a:extLst>
+          </p:cNvPr>
+          <p:cNvSpPr>
+            <a:spLocks noGrp="1" noRot="1" noChangeAspect="1" noMove="1" noResize="1" noEditPoints="1" noAdjustHandles="1" noChangeArrowheads="1" noChangeShapeType="1" noTextEdit="1"/>
+          </p:cNvSpPr>
+          <p:nvPr>
+            <p:extLst>
+              <p:ext uri="{386F3935-93C4-4BCD-93E2-E3B085C9AB24}">
+                <p16:designElem xmlns:p16="http://schemas.microsoft.com/office/powerpoint/2015/main" val="1"/>
+              </p:ext>
+            </p:extLst>
+          </p:nvPr>
+        </p:nvSpPr>
+        <p:spPr>
+          <a:xfrm>
+            <a:off x="950614" y="965196"/>
+            <a:ext cx="6476539" cy="4781641"/>
           </a:xfrm>
           <a:prstGeom prst="rect">
             <a:avLst/>
           </a:prstGeom>
           <a:solidFill>
-            <a:schemeClr val="bg1">
-              <a:lumMod val="75000"/>
-              <a:lumOff val="25000"/>
-            </a:schemeClr>
+            <a:schemeClr val="tx1"/>
           </a:solidFill>
-          <a:ln>
-            <a:noFill/>
+          <a:ln w="190500">
+            <a:solidFill>
+              <a:schemeClr val="tx1">
+                <a:alpha val="7000"/>
+              </a:schemeClr>
+            </a:solidFill>
           </a:ln>
-          <a:effectLst>
-            <a:innerShdw blurRad="63500" dist="50800" dir="16200000">
-              <a:prstClr val="black">
-                <a:alpha val="50000"/>
-              </a:prstClr>
-            </a:innerShdw>
-          </a:effectLst>
         </p:spPr>
         <p:style>
           <a:lnRef idx="2">
@@ -6522,174 +6985,55 @@
           </a:p>
         </p:txBody>
       </p:sp>
-      <p:sp>
-        <p:nvSpPr>
-          <p:cNvPr id="2" name="Titel 1">
+      <p:pic>
+        <p:nvPicPr>
+          <p:cNvPr id="1035" name="Picture 2" descr="Related image">
             <a:extLst>
               <a:ext uri="{FF2B5EF4-FFF2-40B4-BE49-F238E27FC236}">
-                <a16:creationId xmlns:a16="http://schemas.microsoft.com/office/drawing/2014/main" id="{9EE616A2-3362-4BF9-850D-8AD89A70567A}"/>
+                <a16:creationId xmlns:a16="http://schemas.microsoft.com/office/drawing/2014/main" id="{10530653-2B83-410B-933C-277FED94663F}"/>
               </a:ext>
             </a:extLst>
           </p:cNvPr>
-          <p:cNvSpPr>
-            <a:spLocks noGrp="1"/>
-          </p:cNvSpPr>
-          <p:nvPr>
-            <p:ph type="title"/>
-          </p:nvPr>
-        </p:nvSpPr>
-        <p:spPr>
-          <a:xfrm>
-            <a:off x="913795" y="963506"/>
-            <a:ext cx="3740815" cy="4827693"/>
-          </a:xfrm>
-        </p:spPr>
-        <p:txBody>
-          <a:bodyPr>
-            <a:normAutofit/>
-          </a:bodyPr>
-          <a:lstStyle/>
-          <a:p>
-            <a:pPr algn="r"/>
-            <a:r>
-              <a:rPr lang="en-GB" dirty="0"/>
-              <a:t>Rob O’Connor</a:t>
-            </a:r>
-            <a:endParaRPr lang="en-NL"/>
-          </a:p>
-        </p:txBody>
-      </p:sp>
-      <p:cxnSp>
-        <p:nvCxnSpPr>
-          <p:cNvPr id="12" name="Straight Connector 11">
+          <p:cNvPicPr>
+            <a:picLocks noChangeAspect="1" noChangeArrowheads="1"/>
+          </p:cNvPicPr>
+          <p:nvPr/>
+        </p:nvPicPr>
+        <p:blipFill rotWithShape="1">
+          <a:blip r:embed="rId3">
             <a:extLst>
-              <a:ext uri="{FF2B5EF4-FFF2-40B4-BE49-F238E27FC236}">
-                <a16:creationId xmlns:a16="http://schemas.microsoft.com/office/drawing/2014/main" id="{96C7F9CB-BCC3-4648-8DEF-07B0887D87D6}"/>
-              </a:ext>
-              <a:ext uri="{C183D7F6-B498-43B3-948B-1728B52AA6E4}">
-                <adec:decorative xmlns:adec="http://schemas.microsoft.com/office/drawing/2017/decorative" val="1"/>
+              <a:ext uri="{28A0092B-C50C-407E-A947-70E740481C1C}">
+                <a14:useLocalDpi xmlns:a14="http://schemas.microsoft.com/office/drawing/2010/main" val="0"/>
               </a:ext>
             </a:extLst>
-          </p:cNvPr>
-          <p:cNvCxnSpPr>
-            <a:cxnSpLocks noGrp="1" noRot="1" noChangeAspect="1" noMove="1" noResize="1" noEditPoints="1" noAdjustHandles="1" noChangeArrowheads="1" noChangeShapeType="1"/>
-          </p:cNvCxnSpPr>
-          <p:nvPr>
-            <p:extLst>
-              <p:ext uri="{386F3935-93C4-4BCD-93E2-E3B085C9AB24}">
-                <p16:designElem xmlns:p16="http://schemas.microsoft.com/office/powerpoint/2015/main" val="1"/>
-              </p:ext>
-            </p:extLst>
-          </p:nvPr>
-        </p:nvCxnSpPr>
-        <p:spPr>
-          <a:xfrm>
-            <a:off x="4981187" y="2057399"/>
-            <a:ext cx="0" cy="2743200"/>
-          </a:xfrm>
-          <a:prstGeom prst="line">
+          </a:blip>
+          <a:srcRect r="3195" b="-3"/>
+          <a:stretch/>
+        </p:blipFill>
+        <p:spPr bwMode="auto">
+          <a:xfrm>
+            <a:off x="1380489" y="1438360"/>
+            <a:ext cx="5562032" cy="3835314"/>
+          </a:xfrm>
+          <a:prstGeom prst="rect">
             <a:avLst/>
           </a:prstGeom>
-          <a:ln w="19050">
-            <a:solidFill>
-              <a:schemeClr val="accent1"/>
-            </a:solidFill>
-          </a:ln>
-        </p:spPr>
-        <p:style>
-          <a:lnRef idx="1">
-            <a:schemeClr val="accent1"/>
-          </a:lnRef>
-          <a:fillRef idx="0">
-            <a:schemeClr val="accent1"/>
-          </a:fillRef>
-          <a:effectRef idx="0">
-            <a:schemeClr val="accent1"/>
-          </a:effectRef>
-          <a:fontRef idx="minor">
-            <a:schemeClr val="tx1"/>
-          </a:fontRef>
-        </p:style>
-      </p:cxnSp>
-      <p:sp>
-        <p:nvSpPr>
-          <p:cNvPr id="3" name="Tijdelijke aanduiding voor inhoud 2">
-            <a:extLst>
-              <a:ext uri="{FF2B5EF4-FFF2-40B4-BE49-F238E27FC236}">
-                <a16:creationId xmlns:a16="http://schemas.microsoft.com/office/drawing/2014/main" id="{F4D083EA-F002-4683-A212-5697CD9E8C2E}"/>
-              </a:ext>
-            </a:extLst>
-          </p:cNvPr>
-          <p:cNvSpPr>
-            <a:spLocks noGrp="1"/>
-          </p:cNvSpPr>
-          <p:nvPr>
-            <p:ph idx="1"/>
-          </p:nvPr>
-        </p:nvSpPr>
-        <p:spPr>
-          <a:xfrm>
-            <a:off x="5307765" y="963507"/>
-            <a:ext cx="5959791" cy="4827694"/>
-          </a:xfrm>
-          <a:effectLst/>
-        </p:spPr>
-        <p:txBody>
-          <a:bodyPr anchor="ctr">
-            <a:normAutofit/>
-          </a:bodyPr>
-          <a:lstStyle/>
-          <a:p>
-            <a:r>
-              <a:rPr lang="en-GB" dirty="0">
+          <a:noFill/>
+          <a:extLst>
+            <a:ext uri="{909E8E84-426E-40DD-AFC4-6F175D3DCCD1}">
+              <a14:hiddenFill xmlns:a14="http://schemas.microsoft.com/office/drawing/2010/main">
                 <a:solidFill>
-                  <a:schemeClr val="tx1"/>
+                  <a:srgbClr val="FFFFFF"/>
                 </a:solidFill>
-              </a:rPr>
-              <a:t>Art stuff</a:t>
-            </a:r>
-          </a:p>
-          <a:p>
-            <a:r>
-              <a:rPr lang="en-GB" dirty="0">
-                <a:solidFill>
-                  <a:schemeClr val="tx1"/>
-                </a:solidFill>
-              </a:rPr>
-              <a:t>Filming and editing the trailer</a:t>
-            </a:r>
-          </a:p>
-          <a:p>
-            <a:r>
-              <a:rPr lang="en-GB" dirty="0">
-                <a:solidFill>
-                  <a:schemeClr val="tx1"/>
-                </a:solidFill>
-              </a:rPr>
-              <a:t>Scrum Master</a:t>
-            </a:r>
-          </a:p>
-          <a:p>
-            <a:r>
-              <a:rPr lang="en-GB" dirty="0">
-                <a:solidFill>
-                  <a:schemeClr val="tx1"/>
-                </a:solidFill>
-              </a:rPr>
-              <a:t>Animation</a:t>
-            </a:r>
-            <a:endParaRPr lang="en-NL" dirty="0">
-              <a:solidFill>
-                <a:schemeClr val="tx1"/>
-              </a:solidFill>
-            </a:endParaRPr>
-          </a:p>
-        </p:txBody>
-      </p:sp>
+              </a14:hiddenFill>
+            </a:ext>
+          </a:extLst>
+        </p:spPr>
+      </p:pic>
     </p:spTree>
     <p:extLst>
       <p:ext uri="{BB962C8B-B14F-4D97-AF65-F5344CB8AC3E}">
-        <p14:creationId xmlns:p14="http://schemas.microsoft.com/office/powerpoint/2010/main" val="2107328230"/>
+        <p14:creationId xmlns:p14="http://schemas.microsoft.com/office/powerpoint/2010/main" val="3713886159"/>
       </p:ext>
     </p:extLst>
   </p:cSld>
@@ -6699,7 +7043,711 @@
 </p:sld>
 </file>
 
-<file path=ppt/slides/slide12.xml><?xml version="1.0" encoding="utf-8"?>
+<file path=ppt/slides/slide2.xml><?xml version="1.0" encoding="utf-8"?>
+<p:sld xmlns:a="http://schemas.openxmlformats.org/drawingml/2006/main" xmlns:r="http://schemas.openxmlformats.org/officeDocument/2006/relationships" xmlns:p="http://schemas.openxmlformats.org/presentationml/2006/main">
+  <p:cSld>
+    <p:spTree>
+      <p:nvGrpSpPr>
+        <p:cNvPr id="1" name=""/>
+        <p:cNvGrpSpPr/>
+        <p:nvPr/>
+      </p:nvGrpSpPr>
+      <p:grpSpPr>
+        <a:xfrm>
+          <a:off x="0" y="0"/>
+          <a:ext cx="0" cy="0"/>
+          <a:chOff x="0" y="0"/>
+          <a:chExt cx="0" cy="0"/>
+        </a:xfrm>
+      </p:grpSpPr>
+      <p:sp>
+        <p:nvSpPr>
+          <p:cNvPr id="2" name="Titel 1">
+            <a:extLst>
+              <a:ext uri="{FF2B5EF4-FFF2-40B4-BE49-F238E27FC236}">
+                <a16:creationId xmlns:a16="http://schemas.microsoft.com/office/drawing/2014/main" id="{C80A89BF-855D-45BF-A0DC-F242674F9E68}"/>
+              </a:ext>
+            </a:extLst>
+          </p:cNvPr>
+          <p:cNvSpPr>
+            <a:spLocks noGrp="1"/>
+          </p:cNvSpPr>
+          <p:nvPr>
+            <p:ph type="title"/>
+          </p:nvPr>
+        </p:nvSpPr>
+        <p:spPr/>
+        <p:txBody>
+          <a:bodyPr/>
+          <a:lstStyle/>
+          <a:p>
+            <a:r>
+              <a:rPr lang="en-GB" dirty="0"/>
+              <a:t>Trailer</a:t>
+            </a:r>
+            <a:endParaRPr lang="en-NL" dirty="0"/>
+          </a:p>
+        </p:txBody>
+      </p:sp>
+      <p:sp>
+        <p:nvSpPr>
+          <p:cNvPr id="3" name="Tijdelijke aanduiding voor inhoud 2">
+            <a:extLst>
+              <a:ext uri="{FF2B5EF4-FFF2-40B4-BE49-F238E27FC236}">
+                <a16:creationId xmlns:a16="http://schemas.microsoft.com/office/drawing/2014/main" id="{D672A92F-3FCB-427B-A084-A65F8136D725}"/>
+              </a:ext>
+            </a:extLst>
+          </p:cNvPr>
+          <p:cNvSpPr>
+            <a:spLocks noGrp="1"/>
+          </p:cNvSpPr>
+          <p:nvPr>
+            <p:ph idx="1"/>
+          </p:nvPr>
+        </p:nvSpPr>
+        <p:spPr/>
+        <p:txBody>
+          <a:bodyPr/>
+          <a:lstStyle/>
+          <a:p>
+            <a:endParaRPr lang="en-NL"/>
+          </a:p>
+        </p:txBody>
+      </p:sp>
+    </p:spTree>
+    <p:extLst>
+      <p:ext uri="{BB962C8B-B14F-4D97-AF65-F5344CB8AC3E}">
+        <p14:creationId xmlns:p14="http://schemas.microsoft.com/office/powerpoint/2010/main" val="932367827"/>
+      </p:ext>
+    </p:extLst>
+  </p:cSld>
+  <p:clrMapOvr>
+    <a:masterClrMapping/>
+  </p:clrMapOvr>
+</p:sld>
+</file>
+
+<file path=ppt/slides/slide3.xml><?xml version="1.0" encoding="utf-8"?>
+<p:sld xmlns:a="http://schemas.openxmlformats.org/drawingml/2006/main" xmlns:r="http://schemas.openxmlformats.org/officeDocument/2006/relationships" xmlns:p="http://schemas.openxmlformats.org/presentationml/2006/main">
+  <p:cSld>
+    <p:spTree>
+      <p:nvGrpSpPr>
+        <p:cNvPr id="1" name=""/>
+        <p:cNvGrpSpPr/>
+        <p:nvPr/>
+      </p:nvGrpSpPr>
+      <p:grpSpPr>
+        <a:xfrm>
+          <a:off x="0" y="0"/>
+          <a:ext cx="0" cy="0"/>
+          <a:chOff x="0" y="0"/>
+          <a:chExt cx="0" cy="0"/>
+        </a:xfrm>
+      </p:grpSpPr>
+      <p:sp>
+        <p:nvSpPr>
+          <p:cNvPr id="2" name="Titel 1">
+            <a:extLst>
+              <a:ext uri="{FF2B5EF4-FFF2-40B4-BE49-F238E27FC236}">
+                <a16:creationId xmlns:a16="http://schemas.microsoft.com/office/drawing/2014/main" id="{EB156FA2-2AA0-4171-9A81-4DA7C09EF1E5}"/>
+              </a:ext>
+            </a:extLst>
+          </p:cNvPr>
+          <p:cNvSpPr>
+            <a:spLocks noGrp="1"/>
+          </p:cNvSpPr>
+          <p:nvPr>
+            <p:ph type="title"/>
+          </p:nvPr>
+        </p:nvSpPr>
+        <p:spPr/>
+        <p:txBody>
+          <a:bodyPr/>
+          <a:lstStyle/>
+          <a:p>
+            <a:r>
+              <a:rPr lang="en-GB" dirty="0"/>
+              <a:t>The game itself</a:t>
+            </a:r>
+            <a:endParaRPr lang="en-NL" dirty="0"/>
+          </a:p>
+        </p:txBody>
+      </p:sp>
+      <p:sp>
+        <p:nvSpPr>
+          <p:cNvPr id="3" name="Tijdelijke aanduiding voor inhoud 2">
+            <a:extLst>
+              <a:ext uri="{FF2B5EF4-FFF2-40B4-BE49-F238E27FC236}">
+                <a16:creationId xmlns:a16="http://schemas.microsoft.com/office/drawing/2014/main" id="{BDA3B145-3167-40AB-9E76-2CA4E5003A04}"/>
+              </a:ext>
+            </a:extLst>
+          </p:cNvPr>
+          <p:cNvSpPr>
+            <a:spLocks noGrp="1"/>
+          </p:cNvSpPr>
+          <p:nvPr>
+            <p:ph idx="1"/>
+          </p:nvPr>
+        </p:nvSpPr>
+        <p:spPr/>
+        <p:txBody>
+          <a:bodyPr/>
+          <a:lstStyle/>
+          <a:p>
+            <a:pPr marL="36900" indent="0">
+              <a:buNone/>
+            </a:pPr>
+            <a:endParaRPr lang="en-NL" dirty="0"/>
+          </a:p>
+        </p:txBody>
+      </p:sp>
+    </p:spTree>
+    <p:extLst>
+      <p:ext uri="{BB962C8B-B14F-4D97-AF65-F5344CB8AC3E}">
+        <p14:creationId xmlns:p14="http://schemas.microsoft.com/office/powerpoint/2010/main" val="3706014254"/>
+      </p:ext>
+    </p:extLst>
+  </p:cSld>
+  <p:clrMapOvr>
+    <a:masterClrMapping/>
+  </p:clrMapOvr>
+</p:sld>
+</file>
+
+<file path=ppt/slides/slide4.xml><?xml version="1.0" encoding="utf-8"?>
+<p:sld xmlns:a="http://schemas.openxmlformats.org/drawingml/2006/main" xmlns:r="http://schemas.openxmlformats.org/officeDocument/2006/relationships" xmlns:p="http://schemas.openxmlformats.org/presentationml/2006/main">
+  <p:cSld>
+    <p:spTree>
+      <p:nvGrpSpPr>
+        <p:cNvPr id="1" name=""/>
+        <p:cNvGrpSpPr/>
+        <p:nvPr/>
+      </p:nvGrpSpPr>
+      <p:grpSpPr>
+        <a:xfrm>
+          <a:off x="0" y="0"/>
+          <a:ext cx="0" cy="0"/>
+          <a:chOff x="0" y="0"/>
+          <a:chExt cx="0" cy="0"/>
+        </a:xfrm>
+      </p:grpSpPr>
+      <p:sp>
+        <p:nvSpPr>
+          <p:cNvPr id="2" name="Titel 1">
+            <a:extLst>
+              <a:ext uri="{FF2B5EF4-FFF2-40B4-BE49-F238E27FC236}">
+                <a16:creationId xmlns:a16="http://schemas.microsoft.com/office/drawing/2014/main" id="{77BB61AC-92B6-4C5E-BD86-B707546B677B}"/>
+              </a:ext>
+            </a:extLst>
+          </p:cNvPr>
+          <p:cNvSpPr>
+            <a:spLocks noGrp="1"/>
+          </p:cNvSpPr>
+          <p:nvPr>
+            <p:ph type="title"/>
+          </p:nvPr>
+        </p:nvSpPr>
+        <p:spPr/>
+        <p:txBody>
+          <a:bodyPr/>
+          <a:lstStyle/>
+          <a:p>
+            <a:r>
+              <a:rPr lang="en-GB" dirty="0"/>
+              <a:t>Play test results</a:t>
+            </a:r>
+            <a:endParaRPr lang="en-NL" dirty="0"/>
+          </a:p>
+        </p:txBody>
+      </p:sp>
+      <p:sp>
+        <p:nvSpPr>
+          <p:cNvPr id="3" name="Tijdelijke aanduiding voor inhoud 2">
+            <a:extLst>
+              <a:ext uri="{FF2B5EF4-FFF2-40B4-BE49-F238E27FC236}">
+                <a16:creationId xmlns:a16="http://schemas.microsoft.com/office/drawing/2014/main" id="{119ADC2E-BDAF-4FAF-B0A5-8C33DE9DF0CC}"/>
+              </a:ext>
+            </a:extLst>
+          </p:cNvPr>
+          <p:cNvSpPr>
+            <a:spLocks noGrp="1"/>
+          </p:cNvSpPr>
+          <p:nvPr>
+            <p:ph idx="1"/>
+          </p:nvPr>
+        </p:nvSpPr>
+        <p:spPr/>
+        <p:txBody>
+          <a:bodyPr/>
+          <a:lstStyle/>
+          <a:p>
+            <a:r>
+              <a:rPr lang="en-GB" dirty="0"/>
+              <a:t>Feedback</a:t>
+            </a:r>
+          </a:p>
+          <a:p>
+            <a:endParaRPr lang="en-GB" dirty="0"/>
+          </a:p>
+          <a:p>
+            <a:r>
+              <a:rPr lang="en-GB" dirty="0"/>
+              <a:t>Negative / positive</a:t>
+            </a:r>
+          </a:p>
+          <a:p>
+            <a:endParaRPr lang="en-GB" dirty="0"/>
+          </a:p>
+          <a:p>
+            <a:r>
+              <a:rPr lang="en-GB" dirty="0"/>
+              <a:t>Improvements</a:t>
+            </a:r>
+          </a:p>
+          <a:p>
+            <a:endParaRPr lang="en-GB" dirty="0"/>
+          </a:p>
+          <a:p>
+            <a:endParaRPr lang="en-NL" dirty="0"/>
+          </a:p>
+        </p:txBody>
+      </p:sp>
+    </p:spTree>
+    <p:extLst>
+      <p:ext uri="{BB962C8B-B14F-4D97-AF65-F5344CB8AC3E}">
+        <p14:creationId xmlns:p14="http://schemas.microsoft.com/office/powerpoint/2010/main" val="1442216815"/>
+      </p:ext>
+    </p:extLst>
+  </p:cSld>
+  <p:clrMapOvr>
+    <a:masterClrMapping/>
+  </p:clrMapOvr>
+</p:sld>
+</file>
+
+<file path=ppt/slides/slide5.xml><?xml version="1.0" encoding="utf-8"?>
+<p:sld xmlns:a="http://schemas.openxmlformats.org/drawingml/2006/main" xmlns:r="http://schemas.openxmlformats.org/officeDocument/2006/relationships" xmlns:p="http://schemas.openxmlformats.org/presentationml/2006/main">
+  <p:cSld>
+    <p:bg>
+      <p:bgPr>
+        <a:blipFill rotWithShape="1">
+          <a:blip r:embed="rId2">
+            <a:duotone>
+              <a:schemeClr val="bg2">
+                <a:shade val="80000"/>
+                <a:lumMod val="80000"/>
+              </a:schemeClr>
+              <a:schemeClr val="bg2">
+                <a:tint val="98000"/>
+              </a:schemeClr>
+            </a:duotone>
+            <a:extLst/>
+          </a:blip>
+          <a:stretch/>
+        </a:blipFill>
+        <a:effectLst/>
+      </p:bgPr>
+    </p:bg>
+    <p:spTree>
+      <p:nvGrpSpPr>
+        <p:cNvPr id="1" name=""/>
+        <p:cNvGrpSpPr/>
+        <p:nvPr/>
+      </p:nvGrpSpPr>
+      <p:grpSpPr>
+        <a:xfrm>
+          <a:off x="0" y="0"/>
+          <a:ext cx="0" cy="0"/>
+          <a:chOff x="0" y="0"/>
+          <a:chExt cx="0" cy="0"/>
+        </a:xfrm>
+      </p:grpSpPr>
+      <p:sp>
+        <p:nvSpPr>
+          <p:cNvPr id="2" name="Titel 1">
+            <a:extLst>
+              <a:ext uri="{FF2B5EF4-FFF2-40B4-BE49-F238E27FC236}">
+                <a16:creationId xmlns:a16="http://schemas.microsoft.com/office/drawing/2014/main" id="{54852BD1-E06A-47C8-A0C8-E9F12B93C3F0}"/>
+              </a:ext>
+            </a:extLst>
+          </p:cNvPr>
+          <p:cNvSpPr>
+            <a:spLocks noGrp="1"/>
+          </p:cNvSpPr>
+          <p:nvPr>
+            <p:ph type="title"/>
+          </p:nvPr>
+        </p:nvSpPr>
+        <p:spPr>
+          <a:xfrm>
+            <a:off x="5279472" y="609600"/>
+            <a:ext cx="5844759" cy="970450"/>
+          </a:xfrm>
+        </p:spPr>
+        <p:txBody>
+          <a:bodyPr>
+            <a:normAutofit/>
+          </a:bodyPr>
+          <a:lstStyle/>
+          <a:p>
+            <a:r>
+              <a:rPr lang="en-GB">
+                <a:ln>
+                  <a:solidFill>
+                    <a:srgbClr val="404040">
+                      <a:alpha val="10000"/>
+                    </a:srgbClr>
+                  </a:solidFill>
+                </a:ln>
+              </a:rPr>
+              <a:t>Cost Calculations</a:t>
+            </a:r>
+            <a:endParaRPr lang="en-NL">
+              <a:ln>
+                <a:solidFill>
+                  <a:srgbClr val="404040">
+                    <a:alpha val="10000"/>
+                  </a:srgbClr>
+                </a:solidFill>
+              </a:ln>
+            </a:endParaRPr>
+          </a:p>
+        </p:txBody>
+      </p:sp>
+      <p:pic>
+        <p:nvPicPr>
+          <p:cNvPr id="24" name="Picture 23">
+            <a:extLst>
+              <a:ext uri="{FF2B5EF4-FFF2-40B4-BE49-F238E27FC236}">
+                <a16:creationId xmlns:a16="http://schemas.microsoft.com/office/drawing/2014/main" id="{5405F23C-C82E-4181-95EA-321F3D891A40}"/>
+              </a:ext>
+              <a:ext uri="{C183D7F6-B498-43B3-948B-1728B52AA6E4}">
+                <adec:decorative xmlns:adec="http://schemas.microsoft.com/office/drawing/2017/decorative" val="1"/>
+              </a:ext>
+            </a:extLst>
+          </p:cNvPr>
+          <p:cNvPicPr>
+            <a:picLocks noGrp="1" noRot="1" noChangeAspect="1" noMove="1" noResize="1" noEditPoints="1" noAdjustHandles="1" noChangeArrowheads="1" noChangeShapeType="1" noCrop="1"/>
+          </p:cNvPicPr>
+          <p:nvPr>
+            <p:extLst>
+              <p:ext uri="{386F3935-93C4-4BCD-93E2-E3B085C9AB24}">
+                <p16:designElem xmlns:p16="http://schemas.microsoft.com/office/powerpoint/2015/main" val="1"/>
+              </p:ext>
+            </p:extLst>
+          </p:nvPr>
+        </p:nvPicPr>
+        <p:blipFill rotWithShape="1">
+          <a:blip r:embed="rId3">
+            <a:extLst>
+              <a:ext uri="{28A0092B-C50C-407E-A947-70E740481C1C}">
+                <a14:useLocalDpi xmlns:a14="http://schemas.microsoft.com/office/drawing/2010/main" val="0"/>
+              </a:ext>
+            </a:extLst>
+          </a:blip>
+          <a:srcRect t="964" r="2807" b="1446"/>
+          <a:stretch/>
+        </p:blipFill>
+        <p:spPr>
+          <a:xfrm>
+            <a:off x="-10650" y="1"/>
+            <a:ext cx="4966697" cy="6858000"/>
+          </a:xfrm>
+          <a:prstGeom prst="rect">
+            <a:avLst/>
+          </a:prstGeom>
+        </p:spPr>
+      </p:pic>
+      <p:pic>
+        <p:nvPicPr>
+          <p:cNvPr id="7" name="Tijdelijke aanduiding voor inhoud 3">
+            <a:extLst>
+              <a:ext uri="{FF2B5EF4-FFF2-40B4-BE49-F238E27FC236}">
+                <a16:creationId xmlns:a16="http://schemas.microsoft.com/office/drawing/2014/main" id="{115DB8FC-5EF5-467C-9DE3-A528EE8EDD0A}"/>
+              </a:ext>
+            </a:extLst>
+          </p:cNvPr>
+          <p:cNvPicPr>
+            <a:picLocks noChangeAspect="1"/>
+          </p:cNvPicPr>
+          <p:nvPr/>
+        </p:nvPicPr>
+        <p:blipFill>
+          <a:blip r:embed="rId4"/>
+          <a:stretch>
+            <a:fillRect/>
+          </a:stretch>
+        </p:blipFill>
+        <p:spPr>
+          <a:xfrm>
+            <a:off x="365313" y="515163"/>
+            <a:ext cx="4223803" cy="5827673"/>
+          </a:xfrm>
+          <a:prstGeom prst="rect">
+            <a:avLst/>
+          </a:prstGeom>
+        </p:spPr>
+      </p:pic>
+      <p:sp>
+        <p:nvSpPr>
+          <p:cNvPr id="9" name="Content Placeholder 8">
+            <a:extLst>
+              <a:ext uri="{FF2B5EF4-FFF2-40B4-BE49-F238E27FC236}">
+                <a16:creationId xmlns:a16="http://schemas.microsoft.com/office/drawing/2014/main" id="{43EEBB82-F82F-4DDE-8E39-75DEBCF4E45D}"/>
+              </a:ext>
+            </a:extLst>
+          </p:cNvPr>
+          <p:cNvSpPr>
+            <a:spLocks noGrp="1"/>
+          </p:cNvSpPr>
+          <p:nvPr>
+            <p:ph idx="1"/>
+          </p:nvPr>
+        </p:nvSpPr>
+        <p:spPr>
+          <a:xfrm>
+            <a:off x="5279472" y="1828801"/>
+            <a:ext cx="5844760" cy="3866048"/>
+          </a:xfrm>
+        </p:spPr>
+        <p:txBody>
+          <a:bodyPr anchor="ctr">
+            <a:normAutofit/>
+          </a:bodyPr>
+          <a:lstStyle/>
+          <a:p>
+            <a:pPr>
+              <a:buClr>
+                <a:srgbClr val="0079FF"/>
+              </a:buClr>
+            </a:pPr>
+            <a:r>
+              <a:rPr lang="en-US">
+                <a:ln>
+                  <a:solidFill>
+                    <a:srgbClr val="404040">
+                      <a:alpha val="10000"/>
+                    </a:srgbClr>
+                  </a:solidFill>
+                </a:ln>
+              </a:rPr>
+              <a:t>Hours put in</a:t>
+            </a:r>
+          </a:p>
+          <a:p>
+            <a:pPr>
+              <a:buClr>
+                <a:srgbClr val="0079FF"/>
+              </a:buClr>
+            </a:pPr>
+            <a:endParaRPr lang="en-US">
+              <a:ln>
+                <a:solidFill>
+                  <a:srgbClr val="404040">
+                    <a:alpha val="10000"/>
+                  </a:srgbClr>
+                </a:solidFill>
+              </a:ln>
+            </a:endParaRPr>
+          </a:p>
+          <a:p>
+            <a:pPr>
+              <a:buClr>
+                <a:srgbClr val="0079FF"/>
+              </a:buClr>
+            </a:pPr>
+            <a:r>
+              <a:rPr lang="en-US">
+                <a:ln>
+                  <a:solidFill>
+                    <a:srgbClr val="404040">
+                      <a:alpha val="10000"/>
+                    </a:srgbClr>
+                  </a:solidFill>
+                </a:ln>
+              </a:rPr>
+              <a:t>Costs</a:t>
+            </a:r>
+          </a:p>
+          <a:p>
+            <a:pPr>
+              <a:buClr>
+                <a:srgbClr val="0079FF"/>
+              </a:buClr>
+            </a:pPr>
+            <a:endParaRPr lang="en-US">
+              <a:ln>
+                <a:solidFill>
+                  <a:srgbClr val="404040">
+                    <a:alpha val="10000"/>
+                  </a:srgbClr>
+                </a:solidFill>
+              </a:ln>
+            </a:endParaRPr>
+          </a:p>
+          <a:p>
+            <a:pPr>
+              <a:buClr>
+                <a:srgbClr val="0079FF"/>
+              </a:buClr>
+            </a:pPr>
+            <a:r>
+              <a:rPr lang="en-US">
+                <a:ln>
+                  <a:solidFill>
+                    <a:srgbClr val="404040">
+                      <a:alpha val="10000"/>
+                    </a:srgbClr>
+                  </a:solidFill>
+                </a:ln>
+              </a:rPr>
+              <a:t>Arcade casing</a:t>
+            </a:r>
+          </a:p>
+          <a:p>
+            <a:pPr>
+              <a:buClr>
+                <a:srgbClr val="0079FF"/>
+              </a:buClr>
+            </a:pPr>
+            <a:endParaRPr lang="en-US">
+              <a:ln>
+                <a:solidFill>
+                  <a:srgbClr val="404040">
+                    <a:alpha val="10000"/>
+                  </a:srgbClr>
+                </a:solidFill>
+              </a:ln>
+            </a:endParaRPr>
+          </a:p>
+          <a:p>
+            <a:pPr>
+              <a:buClr>
+                <a:srgbClr val="0079FF"/>
+              </a:buClr>
+            </a:pPr>
+            <a:r>
+              <a:rPr lang="en-US">
+                <a:ln>
+                  <a:solidFill>
+                    <a:srgbClr val="404040">
+                      <a:alpha val="10000"/>
+                    </a:srgbClr>
+                  </a:solidFill>
+                </a:ln>
+              </a:rPr>
+              <a:t>Profits </a:t>
+            </a:r>
+          </a:p>
+        </p:txBody>
+      </p:sp>
+    </p:spTree>
+    <p:extLst>
+      <p:ext uri="{BB962C8B-B14F-4D97-AF65-F5344CB8AC3E}">
+        <p14:creationId xmlns:p14="http://schemas.microsoft.com/office/powerpoint/2010/main" val="1897787710"/>
+      </p:ext>
+    </p:extLst>
+  </p:cSld>
+  <p:clrMapOvr>
+    <a:masterClrMapping/>
+  </p:clrMapOvr>
+</p:sld>
+</file>
+
+<file path=ppt/slides/slide6.xml><?xml version="1.0" encoding="utf-8"?>
+<p:sld xmlns:a="http://schemas.openxmlformats.org/drawingml/2006/main" xmlns:r="http://schemas.openxmlformats.org/officeDocument/2006/relationships" xmlns:p="http://schemas.openxmlformats.org/presentationml/2006/main">
+  <p:cSld>
+    <p:spTree>
+      <p:nvGrpSpPr>
+        <p:cNvPr id="1" name=""/>
+        <p:cNvGrpSpPr/>
+        <p:nvPr/>
+      </p:nvGrpSpPr>
+      <p:grpSpPr>
+        <a:xfrm>
+          <a:off x="0" y="0"/>
+          <a:ext cx="0" cy="0"/>
+          <a:chOff x="0" y="0"/>
+          <a:chExt cx="0" cy="0"/>
+        </a:xfrm>
+      </p:grpSpPr>
+      <p:sp>
+        <p:nvSpPr>
+          <p:cNvPr id="2" name="Titel 1">
+            <a:extLst>
+              <a:ext uri="{FF2B5EF4-FFF2-40B4-BE49-F238E27FC236}">
+                <a16:creationId xmlns:a16="http://schemas.microsoft.com/office/drawing/2014/main" id="{C7AB1788-D74B-45A4-A138-82B1BCACE368}"/>
+              </a:ext>
+            </a:extLst>
+          </p:cNvPr>
+          <p:cNvSpPr>
+            <a:spLocks noGrp="1"/>
+          </p:cNvSpPr>
+          <p:nvPr>
+            <p:ph type="title"/>
+          </p:nvPr>
+        </p:nvSpPr>
+        <p:spPr/>
+        <p:txBody>
+          <a:bodyPr/>
+          <a:lstStyle/>
+          <a:p>
+            <a:r>
+              <a:rPr lang="en-GB" dirty="0"/>
+              <a:t>Trello</a:t>
+            </a:r>
+            <a:endParaRPr lang="en-NL" dirty="0"/>
+          </a:p>
+        </p:txBody>
+      </p:sp>
+      <p:sp>
+        <p:nvSpPr>
+          <p:cNvPr id="3" name="Tijdelijke aanduiding voor inhoud 2">
+            <a:extLst>
+              <a:ext uri="{FF2B5EF4-FFF2-40B4-BE49-F238E27FC236}">
+                <a16:creationId xmlns:a16="http://schemas.microsoft.com/office/drawing/2014/main" id="{9ABC7519-E8AE-481D-84E2-B20FA3C2A839}"/>
+              </a:ext>
+            </a:extLst>
+          </p:cNvPr>
+          <p:cNvSpPr>
+            <a:spLocks noGrp="1"/>
+          </p:cNvSpPr>
+          <p:nvPr>
+            <p:ph idx="1"/>
+          </p:nvPr>
+        </p:nvSpPr>
+        <p:spPr/>
+        <p:txBody>
+          <a:bodyPr/>
+          <a:lstStyle/>
+          <a:p>
+            <a:r>
+              <a:rPr lang="en-US" dirty="0">
+                <a:hlinkClick r:id="rId2"/>
+              </a:rPr>
+              <a:t>https://trello.com/b/hwzg7ors/project-lift-off</a:t>
+            </a:r>
+            <a:endParaRPr lang="en-US" dirty="0"/>
+          </a:p>
+          <a:p>
+            <a:endParaRPr lang="en-NL" dirty="0"/>
+          </a:p>
+        </p:txBody>
+      </p:sp>
+    </p:spTree>
+    <p:extLst>
+      <p:ext uri="{BB962C8B-B14F-4D97-AF65-F5344CB8AC3E}">
+        <p14:creationId xmlns:p14="http://schemas.microsoft.com/office/powerpoint/2010/main" val="1133003151"/>
+      </p:ext>
+    </p:extLst>
+  </p:cSld>
+  <p:clrMapOvr>
+    <a:masterClrMapping/>
+  </p:clrMapOvr>
+</p:sld>
+</file>
+
+<file path=ppt/slides/slide7.xml><?xml version="1.0" encoding="utf-8"?>
 <p:sld xmlns:a="http://schemas.openxmlformats.org/drawingml/2006/main" xmlns:r="http://schemas.openxmlformats.org/officeDocument/2006/relationships" xmlns:p="http://schemas.openxmlformats.org/presentationml/2006/main">
   <p:cSld>
     <p:bg>
@@ -6738,7 +7786,7 @@
       </p:grpSpPr>
       <p:sp useBgFill="1">
         <p:nvSpPr>
-          <p:cNvPr id="8" name="Rectangle 7">
+          <p:cNvPr id="18" name="Rectangle 17">
             <a:extLst>
               <a:ext uri="{FF2B5EF4-FFF2-40B4-BE49-F238E27FC236}">
                 <a16:creationId xmlns:a16="http://schemas.microsoft.com/office/drawing/2014/main" id="{9A6C2C86-63BF-47D5-AA3F-905111A238E2}"/>
@@ -6801,7 +7849,7 @@
           <p:cNvPr id="2" name="Titel 1">
             <a:extLst>
               <a:ext uri="{FF2B5EF4-FFF2-40B4-BE49-F238E27FC236}">
-                <a16:creationId xmlns:a16="http://schemas.microsoft.com/office/drawing/2014/main" id="{A4AA4E2F-F350-418E-81E7-93B92EEB49D7}"/>
+                <a16:creationId xmlns:a16="http://schemas.microsoft.com/office/drawing/2014/main" id="{322B5472-8EEA-4F15-87DD-D8545FE70383}"/>
               </a:ext>
             </a:extLst>
           </p:cNvPr>
@@ -6827,7 +7875,7 @@
             <a:pPr algn="l"/>
             <a:r>
               <a:rPr lang="en-GB" sz="3600"/>
-              <a:t>Georgi Statev</a:t>
+              <a:t>Glynn Leine (engineer)</a:t>
             </a:r>
             <a:endParaRPr lang="en-NL" sz="3600"/>
           </a:p>
@@ -6835,7 +7883,7 @@
       </p:sp>
       <p:cxnSp>
         <p:nvCxnSpPr>
-          <p:cNvPr id="10" name="Straight Connector 9">
+          <p:cNvPr id="20" name="Straight Connector 19">
             <a:extLst>
               <a:ext uri="{FF2B5EF4-FFF2-40B4-BE49-F238E27FC236}">
                 <a16:creationId xmlns:a16="http://schemas.microsoft.com/office/drawing/2014/main" id="{425A0768-3044-4AA9-A889-D2CAA68C517A}"/>
@@ -6890,7 +7938,7 @@
           <p:cNvPr id="3" name="Tijdelijke aanduiding voor inhoud 2">
             <a:extLst>
               <a:ext uri="{FF2B5EF4-FFF2-40B4-BE49-F238E27FC236}">
-                <a16:creationId xmlns:a16="http://schemas.microsoft.com/office/drawing/2014/main" id="{7E3A0AE5-A26F-4077-9A96-1D5A245EED7A}"/>
+                <a16:creationId xmlns:a16="http://schemas.microsoft.com/office/drawing/2014/main" id="{D1E9DA61-CB0C-4828-9FBF-CA48F24FC441}"/>
               </a:ext>
             </a:extLst>
           </p:cNvPr>
@@ -6915,20 +7963,16 @@
           <a:p>
             <a:r>
               <a:rPr lang="en-GB" dirty="0"/>
-              <a:t>Art stuff</a:t>
+              <a:t>Everything that has to do with coding</a:t>
             </a:r>
           </a:p>
           <a:p>
             <a:r>
               <a:rPr lang="en-GB" dirty="0"/>
-              <a:t>Tiles</a:t>
-            </a:r>
-          </a:p>
-          <a:p>
-            <a:r>
-              <a:rPr lang="en-GB" dirty="0"/>
-              <a:t>animation</a:t>
-            </a:r>
+              <a:t>Arduino</a:t>
+            </a:r>
+          </a:p>
+          <a:p>
             <a:endParaRPr lang="en-NL" dirty="0"/>
           </a:p>
         </p:txBody>
@@ -6936,863 +7980,7 @@
     </p:spTree>
     <p:extLst>
       <p:ext uri="{BB962C8B-B14F-4D97-AF65-F5344CB8AC3E}">
-        <p14:creationId xmlns:p14="http://schemas.microsoft.com/office/powerpoint/2010/main" val="1654114158"/>
-      </p:ext>
-    </p:extLst>
-  </p:cSld>
-  <p:clrMapOvr>
-    <a:masterClrMapping/>
-  </p:clrMapOvr>
-</p:sld>
-</file>
-
-<file path=ppt/slides/slide13.xml><?xml version="1.0" encoding="utf-8"?>
-<p:sld xmlns:a="http://schemas.openxmlformats.org/drawingml/2006/main" xmlns:r="http://schemas.openxmlformats.org/officeDocument/2006/relationships" xmlns:p="http://schemas.openxmlformats.org/presentationml/2006/main">
-  <p:cSld>
-    <p:spTree>
-      <p:nvGrpSpPr>
-        <p:cNvPr id="1" name=""/>
-        <p:cNvGrpSpPr/>
-        <p:nvPr/>
-      </p:nvGrpSpPr>
-      <p:grpSpPr>
-        <a:xfrm>
-          <a:off x="0" y="0"/>
-          <a:ext cx="0" cy="0"/>
-          <a:chOff x="0" y="0"/>
-          <a:chExt cx="0" cy="0"/>
-        </a:xfrm>
-      </p:grpSpPr>
-      <p:sp>
-        <p:nvSpPr>
-          <p:cNvPr id="2" name="Titel 1">
-            <a:extLst>
-              <a:ext uri="{FF2B5EF4-FFF2-40B4-BE49-F238E27FC236}">
-                <a16:creationId xmlns:a16="http://schemas.microsoft.com/office/drawing/2014/main" id="{1EB59341-CA71-45AD-9110-D77D62267ADF}"/>
-              </a:ext>
-            </a:extLst>
-          </p:cNvPr>
-          <p:cNvSpPr>
-            <a:spLocks noGrp="1"/>
-          </p:cNvSpPr>
-          <p:nvPr>
-            <p:ph type="title"/>
-          </p:nvPr>
-        </p:nvSpPr>
-        <p:spPr/>
-        <p:txBody>
-          <a:bodyPr>
-            <a:normAutofit/>
-          </a:bodyPr>
-          <a:lstStyle/>
-          <a:p>
-            <a:r>
-              <a:rPr lang="en-GB" dirty="0"/>
-              <a:t>Teamwork</a:t>
-            </a:r>
-            <a:endParaRPr lang="en-NL" dirty="0"/>
-          </a:p>
-        </p:txBody>
-      </p:sp>
-      <p:sp>
-        <p:nvSpPr>
-          <p:cNvPr id="3" name="Tijdelijke aanduiding voor inhoud 2">
-            <a:extLst>
-              <a:ext uri="{FF2B5EF4-FFF2-40B4-BE49-F238E27FC236}">
-                <a16:creationId xmlns:a16="http://schemas.microsoft.com/office/drawing/2014/main" id="{2EA55C4F-101C-4784-9271-4526962ABE7D}"/>
-              </a:ext>
-            </a:extLst>
-          </p:cNvPr>
-          <p:cNvSpPr>
-            <a:spLocks noGrp="1"/>
-          </p:cNvSpPr>
-          <p:nvPr>
-            <p:ph idx="1"/>
-          </p:nvPr>
-        </p:nvSpPr>
-        <p:spPr/>
-        <p:txBody>
-          <a:bodyPr/>
-          <a:lstStyle/>
-          <a:p>
-            <a:r>
-              <a:rPr lang="en-GB" dirty="0"/>
-              <a:t>Reflection</a:t>
-            </a:r>
-          </a:p>
-          <a:p>
-            <a:endParaRPr lang="en-GB" dirty="0"/>
-          </a:p>
-          <a:p>
-            <a:r>
-              <a:rPr lang="en-GB" dirty="0"/>
-              <a:t>Communication could be better</a:t>
-            </a:r>
-          </a:p>
-          <a:p>
-            <a:endParaRPr lang="en-GB" dirty="0"/>
-          </a:p>
-          <a:p>
-            <a:r>
-              <a:rPr lang="en-GB" dirty="0"/>
-              <a:t>Be at school on time</a:t>
-            </a:r>
-          </a:p>
-          <a:p>
-            <a:endParaRPr lang="en-GB" dirty="0"/>
-          </a:p>
-          <a:p>
-            <a:r>
-              <a:rPr lang="en-GB" dirty="0"/>
-              <a:t>Peer assessment</a:t>
-            </a:r>
-          </a:p>
-          <a:p>
-            <a:endParaRPr lang="en-GB" dirty="0"/>
-          </a:p>
-          <a:p>
-            <a:r>
-              <a:rPr lang="en-GB" dirty="0"/>
-              <a:t>Roles (examples)</a:t>
-            </a:r>
-          </a:p>
-        </p:txBody>
-      </p:sp>
-    </p:spTree>
-    <p:extLst>
-      <p:ext uri="{BB962C8B-B14F-4D97-AF65-F5344CB8AC3E}">
-        <p14:creationId xmlns:p14="http://schemas.microsoft.com/office/powerpoint/2010/main" val="248716324"/>
-      </p:ext>
-    </p:extLst>
-  </p:cSld>
-  <p:clrMapOvr>
-    <a:masterClrMapping/>
-  </p:clrMapOvr>
-</p:sld>
-</file>
-
-<file path=ppt/slides/slide14.xml><?xml version="1.0" encoding="utf-8"?>
-<p:sld xmlns:a="http://schemas.openxmlformats.org/drawingml/2006/main" xmlns:r="http://schemas.openxmlformats.org/officeDocument/2006/relationships" xmlns:p="http://schemas.openxmlformats.org/presentationml/2006/main">
-  <p:cSld>
-    <p:bg>
-      <p:bgPr>
-        <a:blipFill rotWithShape="1">
-          <a:blip r:embed="rId2">
-            <a:duotone>
-              <a:schemeClr val="bg2">
-                <a:shade val="80000"/>
-                <a:lumMod val="80000"/>
-              </a:schemeClr>
-              <a:schemeClr val="bg2">
-                <a:tint val="98000"/>
-              </a:schemeClr>
-            </a:duotone>
-            <a:extLst/>
-          </a:blip>
-          <a:stretch/>
-        </a:blipFill>
-        <a:effectLst/>
-      </p:bgPr>
-    </p:bg>
-    <p:spTree>
-      <p:nvGrpSpPr>
-        <p:cNvPr id="1" name=""/>
-        <p:cNvGrpSpPr/>
-        <p:nvPr/>
-      </p:nvGrpSpPr>
-      <p:grpSpPr>
-        <a:xfrm>
-          <a:off x="0" y="0"/>
-          <a:ext cx="0" cy="0"/>
-          <a:chOff x="0" y="0"/>
-          <a:chExt cx="0" cy="0"/>
-        </a:xfrm>
-      </p:grpSpPr>
-      <p:sp>
-        <p:nvSpPr>
-          <p:cNvPr id="2" name="Titel 1">
-            <a:extLst>
-              <a:ext uri="{FF2B5EF4-FFF2-40B4-BE49-F238E27FC236}">
-                <a16:creationId xmlns:a16="http://schemas.microsoft.com/office/drawing/2014/main" id="{8C793FC3-5889-46EE-A3DA-6AF18CCEAE31}"/>
-              </a:ext>
-            </a:extLst>
-          </p:cNvPr>
-          <p:cNvSpPr>
-            <a:spLocks noGrp="1"/>
-          </p:cNvSpPr>
-          <p:nvPr>
-            <p:ph type="title"/>
-          </p:nvPr>
-        </p:nvSpPr>
-        <p:spPr>
-          <a:xfrm>
-            <a:off x="8094617" y="965196"/>
-            <a:ext cx="3137262" cy="2633146"/>
-          </a:xfrm>
-        </p:spPr>
-        <p:txBody>
-          <a:bodyPr vert="horz" lIns="91440" tIns="45720" rIns="91440" bIns="45720" rtlCol="0" anchor="b">
-            <a:normAutofit/>
-          </a:bodyPr>
-          <a:lstStyle/>
-          <a:p>
-            <a:r>
-              <a:rPr lang="en-US"/>
-              <a:t>Questions?</a:t>
-            </a:r>
-          </a:p>
-        </p:txBody>
-      </p:sp>
-      <p:sp>
-        <p:nvSpPr>
-          <p:cNvPr id="80" name="Rectangle 79">
-            <a:extLst>
-              <a:ext uri="{FF2B5EF4-FFF2-40B4-BE49-F238E27FC236}">
-                <a16:creationId xmlns:a16="http://schemas.microsoft.com/office/drawing/2014/main" id="{93A46EEB-10AB-4E52-AF22-A848AE9259F9}"/>
-              </a:ext>
-              <a:ext uri="{C183D7F6-B498-43B3-948B-1728B52AA6E4}">
-                <adec:decorative xmlns:adec="http://schemas.microsoft.com/office/drawing/2017/decorative" val="1"/>
-              </a:ext>
-            </a:extLst>
-          </p:cNvPr>
-          <p:cNvSpPr>
-            <a:spLocks noGrp="1" noRot="1" noChangeAspect="1" noMove="1" noResize="1" noEditPoints="1" noAdjustHandles="1" noChangeArrowheads="1" noChangeShapeType="1" noTextEdit="1"/>
-          </p:cNvSpPr>
-          <p:nvPr>
-            <p:extLst>
-              <p:ext uri="{386F3935-93C4-4BCD-93E2-E3B085C9AB24}">
-                <p16:designElem xmlns:p16="http://schemas.microsoft.com/office/powerpoint/2015/main" val="1"/>
-              </p:ext>
-            </p:extLst>
-          </p:nvPr>
-        </p:nvSpPr>
-        <p:spPr>
-          <a:xfrm>
-            <a:off x="950614" y="965196"/>
-            <a:ext cx="6476539" cy="4781641"/>
-          </a:xfrm>
-          <a:prstGeom prst="rect">
-            <a:avLst/>
-          </a:prstGeom>
-          <a:solidFill>
-            <a:schemeClr val="tx1"/>
-          </a:solidFill>
-          <a:ln w="190500">
-            <a:solidFill>
-              <a:schemeClr val="tx1">
-                <a:alpha val="7000"/>
-              </a:schemeClr>
-            </a:solidFill>
-          </a:ln>
-        </p:spPr>
-        <p:style>
-          <a:lnRef idx="2">
-            <a:schemeClr val="accent1">
-              <a:shade val="50000"/>
-            </a:schemeClr>
-          </a:lnRef>
-          <a:fillRef idx="1">
-            <a:schemeClr val="accent1"/>
-          </a:fillRef>
-          <a:effectRef idx="0">
-            <a:schemeClr val="accent1"/>
-          </a:effectRef>
-          <a:fontRef idx="minor">
-            <a:schemeClr val="lt1"/>
-          </a:fontRef>
-        </p:style>
-        <p:txBody>
-          <a:bodyPr rtlCol="0" anchor="ctr"/>
-          <a:lstStyle/>
-          <a:p>
-            <a:pPr algn="ctr"/>
-            <a:endParaRPr lang="en-US"/>
-          </a:p>
-        </p:txBody>
-      </p:sp>
-      <p:pic>
-        <p:nvPicPr>
-          <p:cNvPr id="1035" name="Picture 2" descr="Related image">
-            <a:extLst>
-              <a:ext uri="{FF2B5EF4-FFF2-40B4-BE49-F238E27FC236}">
-                <a16:creationId xmlns:a16="http://schemas.microsoft.com/office/drawing/2014/main" id="{10530653-2B83-410B-933C-277FED94663F}"/>
-              </a:ext>
-            </a:extLst>
-          </p:cNvPr>
-          <p:cNvPicPr>
-            <a:picLocks noChangeAspect="1" noChangeArrowheads="1"/>
-          </p:cNvPicPr>
-          <p:nvPr/>
-        </p:nvPicPr>
-        <p:blipFill rotWithShape="1">
-          <a:blip r:embed="rId3">
-            <a:extLst>
-              <a:ext uri="{28A0092B-C50C-407E-A947-70E740481C1C}">
-                <a14:useLocalDpi xmlns:a14="http://schemas.microsoft.com/office/drawing/2010/main" val="0"/>
-              </a:ext>
-            </a:extLst>
-          </a:blip>
-          <a:srcRect r="3195" b="-3"/>
-          <a:stretch/>
-        </p:blipFill>
-        <p:spPr bwMode="auto">
-          <a:xfrm>
-            <a:off x="1380489" y="1438360"/>
-            <a:ext cx="5562032" cy="3835314"/>
-          </a:xfrm>
-          <a:prstGeom prst="rect">
-            <a:avLst/>
-          </a:prstGeom>
-          <a:noFill/>
-          <a:extLst>
-            <a:ext uri="{909E8E84-426E-40DD-AFC4-6F175D3DCCD1}">
-              <a14:hiddenFill xmlns:a14="http://schemas.microsoft.com/office/drawing/2010/main">
-                <a:solidFill>
-                  <a:srgbClr val="FFFFFF"/>
-                </a:solidFill>
-              </a14:hiddenFill>
-            </a:ext>
-          </a:extLst>
-        </p:spPr>
-      </p:pic>
-    </p:spTree>
-    <p:extLst>
-      <p:ext uri="{BB962C8B-B14F-4D97-AF65-F5344CB8AC3E}">
-        <p14:creationId xmlns:p14="http://schemas.microsoft.com/office/powerpoint/2010/main" val="3713886159"/>
-      </p:ext>
-    </p:extLst>
-  </p:cSld>
-  <p:clrMapOvr>
-    <a:masterClrMapping/>
-  </p:clrMapOvr>
-</p:sld>
-</file>
-
-<file path=ppt/slides/slide2.xml><?xml version="1.0" encoding="utf-8"?>
-<p:sld xmlns:a="http://schemas.openxmlformats.org/drawingml/2006/main" xmlns:r="http://schemas.openxmlformats.org/officeDocument/2006/relationships" xmlns:p="http://schemas.openxmlformats.org/presentationml/2006/main">
-  <p:cSld>
-    <p:spTree>
-      <p:nvGrpSpPr>
-        <p:cNvPr id="1" name=""/>
-        <p:cNvGrpSpPr/>
-        <p:nvPr/>
-      </p:nvGrpSpPr>
-      <p:grpSpPr>
-        <a:xfrm>
-          <a:off x="0" y="0"/>
-          <a:ext cx="0" cy="0"/>
-          <a:chOff x="0" y="0"/>
-          <a:chExt cx="0" cy="0"/>
-        </a:xfrm>
-      </p:grpSpPr>
-      <p:sp>
-        <p:nvSpPr>
-          <p:cNvPr id="2" name="Titel 1">
-            <a:extLst>
-              <a:ext uri="{FF2B5EF4-FFF2-40B4-BE49-F238E27FC236}">
-                <a16:creationId xmlns:a16="http://schemas.microsoft.com/office/drawing/2014/main" id="{C80A89BF-855D-45BF-A0DC-F242674F9E68}"/>
-              </a:ext>
-            </a:extLst>
-          </p:cNvPr>
-          <p:cNvSpPr>
-            <a:spLocks noGrp="1"/>
-          </p:cNvSpPr>
-          <p:nvPr>
-            <p:ph type="title"/>
-          </p:nvPr>
-        </p:nvSpPr>
-        <p:spPr/>
-        <p:txBody>
-          <a:bodyPr/>
-          <a:lstStyle/>
-          <a:p>
-            <a:r>
-              <a:rPr lang="en-GB" dirty="0"/>
-              <a:t>Trailer</a:t>
-            </a:r>
-            <a:endParaRPr lang="en-NL" dirty="0"/>
-          </a:p>
-        </p:txBody>
-      </p:sp>
-      <p:sp>
-        <p:nvSpPr>
-          <p:cNvPr id="3" name="Tijdelijke aanduiding voor inhoud 2">
-            <a:extLst>
-              <a:ext uri="{FF2B5EF4-FFF2-40B4-BE49-F238E27FC236}">
-                <a16:creationId xmlns:a16="http://schemas.microsoft.com/office/drawing/2014/main" id="{D672A92F-3FCB-427B-A084-A65F8136D725}"/>
-              </a:ext>
-            </a:extLst>
-          </p:cNvPr>
-          <p:cNvSpPr>
-            <a:spLocks noGrp="1"/>
-          </p:cNvSpPr>
-          <p:nvPr>
-            <p:ph idx="1"/>
-          </p:nvPr>
-        </p:nvSpPr>
-        <p:spPr/>
-        <p:txBody>
-          <a:bodyPr/>
-          <a:lstStyle/>
-          <a:p>
-            <a:endParaRPr lang="en-NL"/>
-          </a:p>
-        </p:txBody>
-      </p:sp>
-    </p:spTree>
-    <p:extLst>
-      <p:ext uri="{BB962C8B-B14F-4D97-AF65-F5344CB8AC3E}">
-        <p14:creationId xmlns:p14="http://schemas.microsoft.com/office/powerpoint/2010/main" val="932367827"/>
-      </p:ext>
-    </p:extLst>
-  </p:cSld>
-  <p:clrMapOvr>
-    <a:masterClrMapping/>
-  </p:clrMapOvr>
-</p:sld>
-</file>
-
-<file path=ppt/slides/slide3.xml><?xml version="1.0" encoding="utf-8"?>
-<p:sld xmlns:a="http://schemas.openxmlformats.org/drawingml/2006/main" xmlns:r="http://schemas.openxmlformats.org/officeDocument/2006/relationships" xmlns:p="http://schemas.openxmlformats.org/presentationml/2006/main">
-  <p:cSld>
-    <p:spTree>
-      <p:nvGrpSpPr>
-        <p:cNvPr id="1" name=""/>
-        <p:cNvGrpSpPr/>
-        <p:nvPr/>
-      </p:nvGrpSpPr>
-      <p:grpSpPr>
-        <a:xfrm>
-          <a:off x="0" y="0"/>
-          <a:ext cx="0" cy="0"/>
-          <a:chOff x="0" y="0"/>
-          <a:chExt cx="0" cy="0"/>
-        </a:xfrm>
-      </p:grpSpPr>
-      <p:sp>
-        <p:nvSpPr>
-          <p:cNvPr id="2" name="Titel 1">
-            <a:extLst>
-              <a:ext uri="{FF2B5EF4-FFF2-40B4-BE49-F238E27FC236}">
-                <a16:creationId xmlns:a16="http://schemas.microsoft.com/office/drawing/2014/main" id="{D17F67D8-6AB5-4A13-8BB8-61F1D27CB49A}"/>
-              </a:ext>
-            </a:extLst>
-          </p:cNvPr>
-          <p:cNvSpPr>
-            <a:spLocks noGrp="1"/>
-          </p:cNvSpPr>
-          <p:nvPr>
-            <p:ph type="title"/>
-          </p:nvPr>
-        </p:nvSpPr>
-        <p:spPr/>
-        <p:txBody>
-          <a:bodyPr/>
-          <a:lstStyle/>
-          <a:p>
-            <a:r>
-              <a:rPr lang="en-GB" dirty="0"/>
-              <a:t>Poster/ Case Design</a:t>
-            </a:r>
-            <a:endParaRPr lang="en-NL" dirty="0"/>
-          </a:p>
-        </p:txBody>
-      </p:sp>
-      <p:sp>
-        <p:nvSpPr>
-          <p:cNvPr id="3" name="Tijdelijke aanduiding voor inhoud 2">
-            <a:extLst>
-              <a:ext uri="{FF2B5EF4-FFF2-40B4-BE49-F238E27FC236}">
-                <a16:creationId xmlns:a16="http://schemas.microsoft.com/office/drawing/2014/main" id="{7DB60690-1019-4BE7-B5BE-AFF5E7F08CB2}"/>
-              </a:ext>
-            </a:extLst>
-          </p:cNvPr>
-          <p:cNvSpPr>
-            <a:spLocks noGrp="1"/>
-          </p:cNvSpPr>
-          <p:nvPr>
-            <p:ph idx="1"/>
-          </p:nvPr>
-        </p:nvSpPr>
-        <p:spPr/>
-        <p:txBody>
-          <a:bodyPr/>
-          <a:lstStyle/>
-          <a:p>
-            <a:endParaRPr lang="en-NL"/>
-          </a:p>
-        </p:txBody>
-      </p:sp>
-    </p:spTree>
-    <p:extLst>
-      <p:ext uri="{BB962C8B-B14F-4D97-AF65-F5344CB8AC3E}">
-        <p14:creationId xmlns:p14="http://schemas.microsoft.com/office/powerpoint/2010/main" val="1407706941"/>
-      </p:ext>
-    </p:extLst>
-  </p:cSld>
-  <p:clrMapOvr>
-    <a:masterClrMapping/>
-  </p:clrMapOvr>
-</p:sld>
-</file>
-
-<file path=ppt/slides/slide4.xml><?xml version="1.0" encoding="utf-8"?>
-<p:sld xmlns:a="http://schemas.openxmlformats.org/drawingml/2006/main" xmlns:r="http://schemas.openxmlformats.org/officeDocument/2006/relationships" xmlns:p="http://schemas.openxmlformats.org/presentationml/2006/main">
-  <p:cSld>
-    <p:spTree>
-      <p:nvGrpSpPr>
-        <p:cNvPr id="1" name=""/>
-        <p:cNvGrpSpPr/>
-        <p:nvPr/>
-      </p:nvGrpSpPr>
-      <p:grpSpPr>
-        <a:xfrm>
-          <a:off x="0" y="0"/>
-          <a:ext cx="0" cy="0"/>
-          <a:chOff x="0" y="0"/>
-          <a:chExt cx="0" cy="0"/>
-        </a:xfrm>
-      </p:grpSpPr>
-      <p:sp>
-        <p:nvSpPr>
-          <p:cNvPr id="2" name="Titel 1">
-            <a:extLst>
-              <a:ext uri="{FF2B5EF4-FFF2-40B4-BE49-F238E27FC236}">
-                <a16:creationId xmlns:a16="http://schemas.microsoft.com/office/drawing/2014/main" id="{EB156FA2-2AA0-4171-9A81-4DA7C09EF1E5}"/>
-              </a:ext>
-            </a:extLst>
-          </p:cNvPr>
-          <p:cNvSpPr>
-            <a:spLocks noGrp="1"/>
-          </p:cNvSpPr>
-          <p:nvPr>
-            <p:ph type="title"/>
-          </p:nvPr>
-        </p:nvSpPr>
-        <p:spPr/>
-        <p:txBody>
-          <a:bodyPr/>
-          <a:lstStyle/>
-          <a:p>
-            <a:r>
-              <a:rPr lang="en-GB" dirty="0"/>
-              <a:t>The game itself</a:t>
-            </a:r>
-            <a:endParaRPr lang="en-NL" dirty="0"/>
-          </a:p>
-        </p:txBody>
-      </p:sp>
-      <p:sp>
-        <p:nvSpPr>
-          <p:cNvPr id="3" name="Tijdelijke aanduiding voor inhoud 2">
-            <a:extLst>
-              <a:ext uri="{FF2B5EF4-FFF2-40B4-BE49-F238E27FC236}">
-                <a16:creationId xmlns:a16="http://schemas.microsoft.com/office/drawing/2014/main" id="{BDA3B145-3167-40AB-9E76-2CA4E5003A04}"/>
-              </a:ext>
-            </a:extLst>
-          </p:cNvPr>
-          <p:cNvSpPr>
-            <a:spLocks noGrp="1"/>
-          </p:cNvSpPr>
-          <p:nvPr>
-            <p:ph idx="1"/>
-          </p:nvPr>
-        </p:nvSpPr>
-        <p:spPr/>
-        <p:txBody>
-          <a:bodyPr/>
-          <a:lstStyle/>
-          <a:p>
-            <a:pPr marL="36900" indent="0">
-              <a:buNone/>
-            </a:pPr>
-            <a:endParaRPr lang="en-NL" dirty="0"/>
-          </a:p>
-        </p:txBody>
-      </p:sp>
-    </p:spTree>
-    <p:extLst>
-      <p:ext uri="{BB962C8B-B14F-4D97-AF65-F5344CB8AC3E}">
-        <p14:creationId xmlns:p14="http://schemas.microsoft.com/office/powerpoint/2010/main" val="3706014254"/>
-      </p:ext>
-    </p:extLst>
-  </p:cSld>
-  <p:clrMapOvr>
-    <a:masterClrMapping/>
-  </p:clrMapOvr>
-</p:sld>
-</file>
-
-<file path=ppt/slides/slide5.xml><?xml version="1.0" encoding="utf-8"?>
-<p:sld xmlns:a="http://schemas.openxmlformats.org/drawingml/2006/main" xmlns:r="http://schemas.openxmlformats.org/officeDocument/2006/relationships" xmlns:p="http://schemas.openxmlformats.org/presentationml/2006/main">
-  <p:cSld>
-    <p:spTree>
-      <p:nvGrpSpPr>
-        <p:cNvPr id="1" name=""/>
-        <p:cNvGrpSpPr/>
-        <p:nvPr/>
-      </p:nvGrpSpPr>
-      <p:grpSpPr>
-        <a:xfrm>
-          <a:off x="0" y="0"/>
-          <a:ext cx="0" cy="0"/>
-          <a:chOff x="0" y="0"/>
-          <a:chExt cx="0" cy="0"/>
-        </a:xfrm>
-      </p:grpSpPr>
-      <p:sp>
-        <p:nvSpPr>
-          <p:cNvPr id="2" name="Titel 1">
-            <a:extLst>
-              <a:ext uri="{FF2B5EF4-FFF2-40B4-BE49-F238E27FC236}">
-                <a16:creationId xmlns:a16="http://schemas.microsoft.com/office/drawing/2014/main" id="{77BB61AC-92B6-4C5E-BD86-B707546B677B}"/>
-              </a:ext>
-            </a:extLst>
-          </p:cNvPr>
-          <p:cNvSpPr>
-            <a:spLocks noGrp="1"/>
-          </p:cNvSpPr>
-          <p:nvPr>
-            <p:ph type="title"/>
-          </p:nvPr>
-        </p:nvSpPr>
-        <p:spPr/>
-        <p:txBody>
-          <a:bodyPr/>
-          <a:lstStyle/>
-          <a:p>
-            <a:r>
-              <a:rPr lang="en-GB" dirty="0"/>
-              <a:t>Play test results</a:t>
-            </a:r>
-            <a:endParaRPr lang="en-NL" dirty="0"/>
-          </a:p>
-        </p:txBody>
-      </p:sp>
-      <p:sp>
-        <p:nvSpPr>
-          <p:cNvPr id="3" name="Tijdelijke aanduiding voor inhoud 2">
-            <a:extLst>
-              <a:ext uri="{FF2B5EF4-FFF2-40B4-BE49-F238E27FC236}">
-                <a16:creationId xmlns:a16="http://schemas.microsoft.com/office/drawing/2014/main" id="{119ADC2E-BDAF-4FAF-B0A5-8C33DE9DF0CC}"/>
-              </a:ext>
-            </a:extLst>
-          </p:cNvPr>
-          <p:cNvSpPr>
-            <a:spLocks noGrp="1"/>
-          </p:cNvSpPr>
-          <p:nvPr>
-            <p:ph idx="1"/>
-          </p:nvPr>
-        </p:nvSpPr>
-        <p:spPr/>
-        <p:txBody>
-          <a:bodyPr/>
-          <a:lstStyle/>
-          <a:p>
-            <a:r>
-              <a:rPr lang="en-GB" dirty="0"/>
-              <a:t>Feedback</a:t>
-            </a:r>
-          </a:p>
-          <a:p>
-            <a:endParaRPr lang="en-GB" dirty="0"/>
-          </a:p>
-          <a:p>
-            <a:r>
-              <a:rPr lang="en-GB" dirty="0"/>
-              <a:t>Negative / positive</a:t>
-            </a:r>
-          </a:p>
-          <a:p>
-            <a:endParaRPr lang="en-GB" dirty="0"/>
-          </a:p>
-          <a:p>
-            <a:r>
-              <a:rPr lang="en-GB" dirty="0"/>
-              <a:t>Improvements</a:t>
-            </a:r>
-          </a:p>
-          <a:p>
-            <a:endParaRPr lang="en-GB" dirty="0"/>
-          </a:p>
-          <a:p>
-            <a:endParaRPr lang="en-NL" dirty="0"/>
-          </a:p>
-        </p:txBody>
-      </p:sp>
-    </p:spTree>
-    <p:extLst>
-      <p:ext uri="{BB962C8B-B14F-4D97-AF65-F5344CB8AC3E}">
-        <p14:creationId xmlns:p14="http://schemas.microsoft.com/office/powerpoint/2010/main" val="1442216815"/>
-      </p:ext>
-    </p:extLst>
-  </p:cSld>
-  <p:clrMapOvr>
-    <a:masterClrMapping/>
-  </p:clrMapOvr>
-</p:sld>
-</file>
-
-<file path=ppt/slides/slide6.xml><?xml version="1.0" encoding="utf-8"?>
-<p:sld xmlns:a="http://schemas.openxmlformats.org/drawingml/2006/main" xmlns:r="http://schemas.openxmlformats.org/officeDocument/2006/relationships" xmlns:p="http://schemas.openxmlformats.org/presentationml/2006/main">
-  <p:cSld>
-    <p:spTree>
-      <p:nvGrpSpPr>
-        <p:cNvPr id="1" name=""/>
-        <p:cNvGrpSpPr/>
-        <p:nvPr/>
-      </p:nvGrpSpPr>
-      <p:grpSpPr>
-        <a:xfrm>
-          <a:off x="0" y="0"/>
-          <a:ext cx="0" cy="0"/>
-          <a:chOff x="0" y="0"/>
-          <a:chExt cx="0" cy="0"/>
-        </a:xfrm>
-      </p:grpSpPr>
-      <p:sp>
-        <p:nvSpPr>
-          <p:cNvPr id="2" name="Titel 1">
-            <a:extLst>
-              <a:ext uri="{FF2B5EF4-FFF2-40B4-BE49-F238E27FC236}">
-                <a16:creationId xmlns:a16="http://schemas.microsoft.com/office/drawing/2014/main" id="{54852BD1-E06A-47C8-A0C8-E9F12B93C3F0}"/>
-              </a:ext>
-            </a:extLst>
-          </p:cNvPr>
-          <p:cNvSpPr>
-            <a:spLocks noGrp="1"/>
-          </p:cNvSpPr>
-          <p:nvPr>
-            <p:ph type="title"/>
-          </p:nvPr>
-        </p:nvSpPr>
-        <p:spPr/>
-        <p:txBody>
-          <a:bodyPr/>
-          <a:lstStyle/>
-          <a:p>
-            <a:r>
-              <a:rPr lang="en-GB" dirty="0"/>
-              <a:t>Cost Calculations</a:t>
-            </a:r>
-            <a:endParaRPr lang="en-NL" dirty="0"/>
-          </a:p>
-        </p:txBody>
-      </p:sp>
-      <p:sp>
-        <p:nvSpPr>
-          <p:cNvPr id="3" name="Tijdelijke aanduiding voor inhoud 2">
-            <a:extLst>
-              <a:ext uri="{FF2B5EF4-FFF2-40B4-BE49-F238E27FC236}">
-                <a16:creationId xmlns:a16="http://schemas.microsoft.com/office/drawing/2014/main" id="{BEEF9BEF-F010-4440-9ED8-76A7688C62F9}"/>
-              </a:ext>
-            </a:extLst>
-          </p:cNvPr>
-          <p:cNvSpPr>
-            <a:spLocks noGrp="1"/>
-          </p:cNvSpPr>
-          <p:nvPr>
-            <p:ph idx="1"/>
-          </p:nvPr>
-        </p:nvSpPr>
-        <p:spPr/>
-        <p:txBody>
-          <a:bodyPr/>
-          <a:lstStyle/>
-          <a:p>
-            <a:endParaRPr lang="en-NL"/>
-          </a:p>
-        </p:txBody>
-      </p:sp>
-    </p:spTree>
-    <p:extLst>
-      <p:ext uri="{BB962C8B-B14F-4D97-AF65-F5344CB8AC3E}">
-        <p14:creationId xmlns:p14="http://schemas.microsoft.com/office/powerpoint/2010/main" val="1897787710"/>
-      </p:ext>
-    </p:extLst>
-  </p:cSld>
-  <p:clrMapOvr>
-    <a:masterClrMapping/>
-  </p:clrMapOvr>
-</p:sld>
-</file>
-
-<file path=ppt/slides/slide7.xml><?xml version="1.0" encoding="utf-8"?>
-<p:sld xmlns:a="http://schemas.openxmlformats.org/drawingml/2006/main" xmlns:r="http://schemas.openxmlformats.org/officeDocument/2006/relationships" xmlns:p="http://schemas.openxmlformats.org/presentationml/2006/main">
-  <p:cSld>
-    <p:spTree>
-      <p:nvGrpSpPr>
-        <p:cNvPr id="1" name=""/>
-        <p:cNvGrpSpPr/>
-        <p:nvPr/>
-      </p:nvGrpSpPr>
-      <p:grpSpPr>
-        <a:xfrm>
-          <a:off x="0" y="0"/>
-          <a:ext cx="0" cy="0"/>
-          <a:chOff x="0" y="0"/>
-          <a:chExt cx="0" cy="0"/>
-        </a:xfrm>
-      </p:grpSpPr>
-      <p:sp>
-        <p:nvSpPr>
-          <p:cNvPr id="2" name="Titel 1">
-            <a:extLst>
-              <a:ext uri="{FF2B5EF4-FFF2-40B4-BE49-F238E27FC236}">
-                <a16:creationId xmlns:a16="http://schemas.microsoft.com/office/drawing/2014/main" id="{C7AB1788-D74B-45A4-A138-82B1BCACE368}"/>
-              </a:ext>
-            </a:extLst>
-          </p:cNvPr>
-          <p:cNvSpPr>
-            <a:spLocks noGrp="1"/>
-          </p:cNvSpPr>
-          <p:nvPr>
-            <p:ph type="title"/>
-          </p:nvPr>
-        </p:nvSpPr>
-        <p:spPr/>
-        <p:txBody>
-          <a:bodyPr/>
-          <a:lstStyle/>
-          <a:p>
-            <a:r>
-              <a:rPr lang="en-GB" dirty="0"/>
-              <a:t>Trello</a:t>
-            </a:r>
-            <a:endParaRPr lang="en-NL" dirty="0"/>
-          </a:p>
-        </p:txBody>
-      </p:sp>
-      <p:sp>
-        <p:nvSpPr>
-          <p:cNvPr id="3" name="Tijdelijke aanduiding voor inhoud 2">
-            <a:extLst>
-              <a:ext uri="{FF2B5EF4-FFF2-40B4-BE49-F238E27FC236}">
-                <a16:creationId xmlns:a16="http://schemas.microsoft.com/office/drawing/2014/main" id="{9ABC7519-E8AE-481D-84E2-B20FA3C2A839}"/>
-              </a:ext>
-            </a:extLst>
-          </p:cNvPr>
-          <p:cNvSpPr>
-            <a:spLocks noGrp="1"/>
-          </p:cNvSpPr>
-          <p:nvPr>
-            <p:ph idx="1"/>
-          </p:nvPr>
-        </p:nvSpPr>
-        <p:spPr/>
-        <p:txBody>
-          <a:bodyPr/>
-          <a:lstStyle/>
-          <a:p>
-            <a:endParaRPr lang="en-NL"/>
-          </a:p>
-        </p:txBody>
-      </p:sp>
-    </p:spTree>
-    <p:extLst>
-      <p:ext uri="{BB962C8B-B14F-4D97-AF65-F5344CB8AC3E}">
-        <p14:creationId xmlns:p14="http://schemas.microsoft.com/office/powerpoint/2010/main" val="1133003151"/>
+        <p14:creationId xmlns:p14="http://schemas.microsoft.com/office/powerpoint/2010/main" val="1676784949"/>
       </p:ext>
     </p:extLst>
   </p:cSld>
@@ -7841,10 +8029,10 @@
       </p:grpSpPr>
       <p:sp useBgFill="1">
         <p:nvSpPr>
-          <p:cNvPr id="18" name="Rectangle 17">
+          <p:cNvPr id="22" name="Rectangle 21">
             <a:extLst>
               <a:ext uri="{FF2B5EF4-FFF2-40B4-BE49-F238E27FC236}">
-                <a16:creationId xmlns:a16="http://schemas.microsoft.com/office/drawing/2014/main" id="{9A6C2C86-63BF-47D5-AA3F-905111A238E2}"/>
+                <a16:creationId xmlns:a16="http://schemas.microsoft.com/office/drawing/2014/main" id="{69652D62-ECFB-408E-ABE6-155A644F433D}"/>
               </a:ext>
               <a:ext uri="{C183D7F6-B498-43B3-948B-1728B52AA6E4}">
                 <adec:decorative xmlns:adec="http://schemas.microsoft.com/office/drawing/2017/decorative" val="1"/>
@@ -7901,10 +8089,83 @@
       </p:sp>
       <p:sp>
         <p:nvSpPr>
+          <p:cNvPr id="24" name="Rectangle 23">
+            <a:extLst>
+              <a:ext uri="{FF2B5EF4-FFF2-40B4-BE49-F238E27FC236}">
+                <a16:creationId xmlns:a16="http://schemas.microsoft.com/office/drawing/2014/main" id="{C1FEA985-924B-4044-8778-32D1E7164C01}"/>
+              </a:ext>
+              <a:ext uri="{C183D7F6-B498-43B3-948B-1728B52AA6E4}">
+                <adec:decorative xmlns:adec="http://schemas.microsoft.com/office/drawing/2017/decorative" val="1"/>
+              </a:ext>
+            </a:extLst>
+          </p:cNvPr>
+          <p:cNvSpPr>
+            <a:spLocks noGrp="1" noRot="1" noChangeAspect="1" noMove="1" noResize="1" noEditPoints="1" noAdjustHandles="1" noChangeArrowheads="1" noChangeShapeType="1" noTextEdit="1"/>
+          </p:cNvSpPr>
+          <p:nvPr>
+            <p:extLst>
+              <p:ext uri="{386F3935-93C4-4BCD-93E2-E3B085C9AB24}">
+                <p16:designElem xmlns:p16="http://schemas.microsoft.com/office/powerpoint/2015/main" val="1"/>
+              </p:ext>
+            </p:extLst>
+          </p:nvPr>
+        </p:nvSpPr>
+        <p:spPr bwMode="ltGray">
+          <a:xfrm>
+            <a:off x="321564" y="320040"/>
+            <a:ext cx="11548872" cy="6217920"/>
+          </a:xfrm>
+          <a:prstGeom prst="rect">
+            <a:avLst/>
+          </a:prstGeom>
+          <a:solidFill>
+            <a:schemeClr val="bg1">
+              <a:lumMod val="75000"/>
+              <a:lumOff val="25000"/>
+            </a:schemeClr>
+          </a:solidFill>
+          <a:ln>
+            <a:noFill/>
+          </a:ln>
+          <a:effectLst>
+            <a:innerShdw blurRad="63500" dist="50800" dir="16200000">
+              <a:prstClr val="black">
+                <a:alpha val="50000"/>
+              </a:prstClr>
+            </a:innerShdw>
+          </a:effectLst>
+        </p:spPr>
+        <p:style>
+          <a:lnRef idx="2">
+            <a:schemeClr val="accent1">
+              <a:shade val="50000"/>
+            </a:schemeClr>
+          </a:lnRef>
+          <a:fillRef idx="1">
+            <a:schemeClr val="accent1"/>
+          </a:fillRef>
+          <a:effectRef idx="0">
+            <a:schemeClr val="accent1"/>
+          </a:effectRef>
+          <a:fontRef idx="minor">
+            <a:schemeClr val="lt1"/>
+          </a:fontRef>
+        </p:style>
+        <p:txBody>
+          <a:bodyPr rtlCol="0" anchor="ctr"/>
+          <a:lstStyle/>
+          <a:p>
+            <a:pPr algn="ctr"/>
+            <a:endParaRPr lang="en-US"/>
+          </a:p>
+        </p:txBody>
+      </p:sp>
+      <p:sp>
+        <p:nvSpPr>
           <p:cNvPr id="2" name="Titel 1">
             <a:extLst>
               <a:ext uri="{FF2B5EF4-FFF2-40B4-BE49-F238E27FC236}">
-                <a16:creationId xmlns:a16="http://schemas.microsoft.com/office/drawing/2014/main" id="{322B5472-8EEA-4F15-87DD-D8545FE70383}"/>
+                <a16:creationId xmlns:a16="http://schemas.microsoft.com/office/drawing/2014/main" id="{5E3EB7BF-E2A7-418D-AE49-26A059C4FCFA}"/>
               </a:ext>
             </a:extLst>
           </p:cNvPr>
@@ -7917,8 +8178,8 @@
         </p:nvSpPr>
         <p:spPr>
           <a:xfrm>
-            <a:off x="834013" y="1115568"/>
-            <a:ext cx="3487616" cy="4626864"/>
+            <a:off x="913795" y="963506"/>
+            <a:ext cx="3740815" cy="4827693"/>
           </a:xfrm>
         </p:spPr>
         <p:txBody>
@@ -7927,21 +8188,21 @@
           </a:bodyPr>
           <a:lstStyle/>
           <a:p>
-            <a:pPr algn="l"/>
-            <a:r>
-              <a:rPr lang="en-GB" sz="3600"/>
-              <a:t>Glynn Leine (engineer)</a:t>
-            </a:r>
-            <a:endParaRPr lang="en-NL" sz="3600"/>
+            <a:pPr algn="r"/>
+            <a:r>
+              <a:rPr lang="en-GB"/>
+              <a:t>Dominique de Graaff (designer)</a:t>
+            </a:r>
+            <a:endParaRPr lang="en-NL"/>
           </a:p>
         </p:txBody>
       </p:sp>
       <p:cxnSp>
         <p:nvCxnSpPr>
-          <p:cNvPr id="20" name="Straight Connector 19">
+          <p:cNvPr id="26" name="Straight Connector 25">
             <a:extLst>
               <a:ext uri="{FF2B5EF4-FFF2-40B4-BE49-F238E27FC236}">
-                <a16:creationId xmlns:a16="http://schemas.microsoft.com/office/drawing/2014/main" id="{425A0768-3044-4AA9-A889-D2CAA68C517A}"/>
+                <a16:creationId xmlns:a16="http://schemas.microsoft.com/office/drawing/2014/main" id="{96C7F9CB-BCC3-4648-8DEF-07B0887D87D6}"/>
               </a:ext>
               <a:ext uri="{C183D7F6-B498-43B3-948B-1728B52AA6E4}">
                 <adec:decorative xmlns:adec="http://schemas.microsoft.com/office/drawing/2017/decorative" val="1"/>
@@ -7961,7 +8222,7 @@
         </p:nvCxnSpPr>
         <p:spPr>
           <a:xfrm>
-            <a:off x="4654605" y="2057400"/>
+            <a:off x="4981187" y="2057399"/>
             <a:ext cx="0" cy="2743200"/>
           </a:xfrm>
           <a:prstGeom prst="line">
@@ -7969,7 +8230,7 @@
           </a:prstGeom>
           <a:ln w="19050">
             <a:solidFill>
-              <a:schemeClr val="tx2"/>
+              <a:schemeClr val="accent1"/>
             </a:solidFill>
           </a:ln>
         </p:spPr>
@@ -7993,7 +8254,7 @@
           <p:cNvPr id="3" name="Tijdelijke aanduiding voor inhoud 2">
             <a:extLst>
               <a:ext uri="{FF2B5EF4-FFF2-40B4-BE49-F238E27FC236}">
-                <a16:creationId xmlns:a16="http://schemas.microsoft.com/office/drawing/2014/main" id="{D1E9DA61-CB0C-4828-9FBF-CA48F24FC441}"/>
+                <a16:creationId xmlns:a16="http://schemas.microsoft.com/office/drawing/2014/main" id="{59FBB472-66EE-4A4A-8A3A-0119C23A7A2C}"/>
               </a:ext>
             </a:extLst>
           </p:cNvPr>
@@ -8006,9 +8267,10 @@
         </p:nvSpPr>
         <p:spPr>
           <a:xfrm>
-            <a:off x="5105398" y="1115568"/>
-            <a:ext cx="6245352" cy="4626864"/>
-          </a:xfrm>
+            <a:off x="5307765" y="963507"/>
+            <a:ext cx="5959791" cy="4827694"/>
+          </a:xfrm>
+          <a:effectLst/>
         </p:spPr>
         <p:txBody>
           <a:bodyPr anchor="ctr">
@@ -8017,30 +8279,108 @@
           <a:lstStyle/>
           <a:p>
             <a:r>
-              <a:rPr lang="en-GB"/>
-              <a:t>Everything that has to do with coding</a:t>
-            </a:r>
-          </a:p>
-          <a:p>
-            <a:r>
-              <a:rPr lang="en-GB"/>
-              <a:t>Arduino </a:t>
-            </a:r>
-            <a:r>
-              <a:rPr lang="en-GB" err="1"/>
-              <a:t>Leanardo</a:t>
-            </a:r>
-            <a:endParaRPr lang="en-GB"/>
-          </a:p>
-          <a:p>
-            <a:endParaRPr lang="en-NL"/>
+              <a:rPr lang="en-GB" dirty="0">
+                <a:solidFill>
+                  <a:schemeClr val="tx1"/>
+                </a:solidFill>
+              </a:rPr>
+              <a:t>PowerPoint presentations</a:t>
+            </a:r>
+          </a:p>
+          <a:p>
+            <a:r>
+              <a:rPr lang="en-GB" dirty="0">
+                <a:solidFill>
+                  <a:schemeClr val="tx1"/>
+                </a:solidFill>
+              </a:rPr>
+              <a:t>Website</a:t>
+            </a:r>
+          </a:p>
+          <a:p>
+            <a:r>
+              <a:rPr lang="en-GB" dirty="0">
+                <a:solidFill>
+                  <a:schemeClr val="tx1"/>
+                </a:solidFill>
+              </a:rPr>
+              <a:t>Game and trailer synopsis</a:t>
+            </a:r>
+          </a:p>
+          <a:p>
+            <a:r>
+              <a:rPr lang="en-GB" dirty="0">
+                <a:solidFill>
+                  <a:schemeClr val="tx1"/>
+                </a:solidFill>
+              </a:rPr>
+              <a:t>Create the design for the speaker and light output</a:t>
+            </a:r>
+          </a:p>
+          <a:p>
+            <a:r>
+              <a:rPr lang="en-GB" dirty="0">
+                <a:solidFill>
+                  <a:schemeClr val="tx1"/>
+                </a:solidFill>
+              </a:rPr>
+              <a:t>Laser cut the board (</a:t>
+            </a:r>
+            <a:r>
+              <a:rPr lang="en-GB" dirty="0" err="1">
+                <a:solidFill>
+                  <a:schemeClr val="tx1"/>
+                </a:solidFill>
+              </a:rPr>
+              <a:t>CaseDesign</a:t>
+            </a:r>
+            <a:r>
+              <a:rPr lang="en-GB" dirty="0">
+                <a:solidFill>
+                  <a:schemeClr val="tx1"/>
+                </a:solidFill>
+              </a:rPr>
+              <a:t>)</a:t>
+            </a:r>
+          </a:p>
+          <a:p>
+            <a:r>
+              <a:rPr lang="en-GB" dirty="0">
+                <a:solidFill>
+                  <a:schemeClr val="tx1"/>
+                </a:solidFill>
+              </a:rPr>
+              <a:t>Playtest </a:t>
+            </a:r>
+          </a:p>
+          <a:p>
+            <a:r>
+              <a:rPr lang="en-GB" dirty="0" err="1">
+                <a:solidFill>
+                  <a:schemeClr val="tx1"/>
+                </a:solidFill>
+              </a:rPr>
+              <a:t>GameDesign</a:t>
+            </a:r>
+            <a:endParaRPr lang="en-GB" dirty="0">
+              <a:solidFill>
+                <a:schemeClr val="tx1"/>
+              </a:solidFill>
+            </a:endParaRPr>
+          </a:p>
+          <a:p>
+            <a:endParaRPr lang="en-NL" dirty="0">
+              <a:solidFill>
+                <a:schemeClr val="tx1"/>
+              </a:solidFill>
+            </a:endParaRPr>
           </a:p>
         </p:txBody>
       </p:sp>
     </p:spTree>
     <p:extLst>
       <p:ext uri="{BB962C8B-B14F-4D97-AF65-F5344CB8AC3E}">
-        <p14:creationId xmlns:p14="http://schemas.microsoft.com/office/powerpoint/2010/main" val="1676784949"/>
+        <p14:creationId xmlns:p14="http://schemas.microsoft.com/office/powerpoint/2010/main" val="3301650441"/>
       </p:ext>
     </p:extLst>
   </p:cSld>
@@ -8089,10 +8429,10 @@
       </p:grpSpPr>
       <p:sp useBgFill="1">
         <p:nvSpPr>
-          <p:cNvPr id="22" name="Rectangle 21">
+          <p:cNvPr id="21" name="Rectangle 14">
             <a:extLst>
               <a:ext uri="{FF2B5EF4-FFF2-40B4-BE49-F238E27FC236}">
-                <a16:creationId xmlns:a16="http://schemas.microsoft.com/office/drawing/2014/main" id="{69652D62-ECFB-408E-ABE6-155A644F433D}"/>
+                <a16:creationId xmlns:a16="http://schemas.microsoft.com/office/drawing/2014/main" id="{9A6C2C86-63BF-47D5-AA3F-905111A238E2}"/>
               </a:ext>
               <a:ext uri="{C183D7F6-B498-43B3-948B-1728B52AA6E4}">
                 <adec:decorative xmlns:adec="http://schemas.microsoft.com/office/drawing/2017/decorative" val="1"/>
@@ -8149,87 +8489,14 @@
       </p:sp>
       <p:sp>
         <p:nvSpPr>
-          <p:cNvPr id="24" name="Rectangle 23">
+          <p:cNvPr id="2" name="Titel 1">
             <a:extLst>
               <a:ext uri="{FF2B5EF4-FFF2-40B4-BE49-F238E27FC236}">
-                <a16:creationId xmlns:a16="http://schemas.microsoft.com/office/drawing/2014/main" id="{C1FEA985-924B-4044-8778-32D1E7164C01}"/>
-              </a:ext>
-              <a:ext uri="{C183D7F6-B498-43B3-948B-1728B52AA6E4}">
-                <adec:decorative xmlns:adec="http://schemas.microsoft.com/office/drawing/2017/decorative" val="1"/>
+                <a16:creationId xmlns:a16="http://schemas.microsoft.com/office/drawing/2014/main" id="{58F2CC8E-F80D-4F37-8B5D-144FB99CF183}"/>
               </a:ext>
             </a:extLst>
           </p:cNvPr>
           <p:cNvSpPr>
-            <a:spLocks noGrp="1" noRot="1" noChangeAspect="1" noMove="1" noResize="1" noEditPoints="1" noAdjustHandles="1" noChangeArrowheads="1" noChangeShapeType="1" noTextEdit="1"/>
-          </p:cNvSpPr>
-          <p:nvPr>
-            <p:extLst>
-              <p:ext uri="{386F3935-93C4-4BCD-93E2-E3B085C9AB24}">
-                <p16:designElem xmlns:p16="http://schemas.microsoft.com/office/powerpoint/2015/main" val="1"/>
-              </p:ext>
-            </p:extLst>
-          </p:nvPr>
-        </p:nvSpPr>
-        <p:spPr bwMode="ltGray">
-          <a:xfrm>
-            <a:off x="321564" y="320040"/>
-            <a:ext cx="11548872" cy="6217920"/>
-          </a:xfrm>
-          <a:prstGeom prst="rect">
-            <a:avLst/>
-          </a:prstGeom>
-          <a:solidFill>
-            <a:schemeClr val="bg1">
-              <a:lumMod val="75000"/>
-              <a:lumOff val="25000"/>
-            </a:schemeClr>
-          </a:solidFill>
-          <a:ln>
-            <a:noFill/>
-          </a:ln>
-          <a:effectLst>
-            <a:innerShdw blurRad="63500" dist="50800" dir="16200000">
-              <a:prstClr val="black">
-                <a:alpha val="50000"/>
-              </a:prstClr>
-            </a:innerShdw>
-          </a:effectLst>
-        </p:spPr>
-        <p:style>
-          <a:lnRef idx="2">
-            <a:schemeClr val="accent1">
-              <a:shade val="50000"/>
-            </a:schemeClr>
-          </a:lnRef>
-          <a:fillRef idx="1">
-            <a:schemeClr val="accent1"/>
-          </a:fillRef>
-          <a:effectRef idx="0">
-            <a:schemeClr val="accent1"/>
-          </a:effectRef>
-          <a:fontRef idx="minor">
-            <a:schemeClr val="lt1"/>
-          </a:fontRef>
-        </p:style>
-        <p:txBody>
-          <a:bodyPr rtlCol="0" anchor="ctr"/>
-          <a:lstStyle/>
-          <a:p>
-            <a:pPr algn="ctr"/>
-            <a:endParaRPr lang="en-US"/>
-          </a:p>
-        </p:txBody>
-      </p:sp>
-      <p:sp>
-        <p:nvSpPr>
-          <p:cNvPr id="2" name="Titel 1">
-            <a:extLst>
-              <a:ext uri="{FF2B5EF4-FFF2-40B4-BE49-F238E27FC236}">
-                <a16:creationId xmlns:a16="http://schemas.microsoft.com/office/drawing/2014/main" id="{5E3EB7BF-E2A7-418D-AE49-26A059C4FCFA}"/>
-              </a:ext>
-            </a:extLst>
-          </p:cNvPr>
-          <p:cNvSpPr>
             <a:spLocks noGrp="1"/>
           </p:cNvSpPr>
           <p:nvPr>
@@ -8238,8 +8505,8 @@
         </p:nvSpPr>
         <p:spPr>
           <a:xfrm>
-            <a:off x="913795" y="963506"/>
-            <a:ext cx="3740815" cy="4827693"/>
+            <a:off x="834013" y="1115568"/>
+            <a:ext cx="3487616" cy="4626864"/>
           </a:xfrm>
         </p:spPr>
         <p:txBody>
@@ -8248,21 +8515,21 @@
           </a:bodyPr>
           <a:lstStyle/>
           <a:p>
-            <a:pPr algn="r"/>
-            <a:r>
-              <a:rPr lang="en-GB"/>
-              <a:t>Dominique de Graaff (designer)</a:t>
-            </a:r>
-            <a:endParaRPr lang="en-NL"/>
+            <a:pPr algn="l"/>
+            <a:r>
+              <a:rPr lang="en-GB" sz="3600"/>
+              <a:t>Rick Oosthof </a:t>
+            </a:r>
+            <a:endParaRPr lang="en-NL" sz="3600"/>
           </a:p>
         </p:txBody>
       </p:sp>
       <p:cxnSp>
         <p:nvCxnSpPr>
-          <p:cNvPr id="26" name="Straight Connector 25">
+          <p:cNvPr id="22" name="Straight Connector 16">
             <a:extLst>
               <a:ext uri="{FF2B5EF4-FFF2-40B4-BE49-F238E27FC236}">
-                <a16:creationId xmlns:a16="http://schemas.microsoft.com/office/drawing/2014/main" id="{96C7F9CB-BCC3-4648-8DEF-07B0887D87D6}"/>
+                <a16:creationId xmlns:a16="http://schemas.microsoft.com/office/drawing/2014/main" id="{425A0768-3044-4AA9-A889-D2CAA68C517A}"/>
               </a:ext>
               <a:ext uri="{C183D7F6-B498-43B3-948B-1728B52AA6E4}">
                 <adec:decorative xmlns:adec="http://schemas.microsoft.com/office/drawing/2017/decorative" val="1"/>
@@ -8282,7 +8549,7 @@
         </p:nvCxnSpPr>
         <p:spPr>
           <a:xfrm>
-            <a:off x="4981187" y="2057399"/>
+            <a:off x="4654605" y="2057400"/>
             <a:ext cx="0" cy="2743200"/>
           </a:xfrm>
           <a:prstGeom prst="line">
@@ -8290,7 +8557,7 @@
           </a:prstGeom>
           <a:ln w="19050">
             <a:solidFill>
-              <a:schemeClr val="accent1"/>
+              <a:schemeClr val="tx2"/>
             </a:solidFill>
           </a:ln>
         </p:spPr>
@@ -8314,7 +8581,7 @@
           <p:cNvPr id="3" name="Tijdelijke aanduiding voor inhoud 2">
             <a:extLst>
               <a:ext uri="{FF2B5EF4-FFF2-40B4-BE49-F238E27FC236}">
-                <a16:creationId xmlns:a16="http://schemas.microsoft.com/office/drawing/2014/main" id="{59FBB472-66EE-4A4A-8A3A-0119C23A7A2C}"/>
+                <a16:creationId xmlns:a16="http://schemas.microsoft.com/office/drawing/2014/main" id="{A59640DC-A8D9-4832-AA85-FA00A2BA4ADB}"/>
               </a:ext>
             </a:extLst>
           </p:cNvPr>
@@ -8327,10 +8594,9 @@
         </p:nvSpPr>
         <p:spPr>
           <a:xfrm>
-            <a:off x="5307765" y="963507"/>
-            <a:ext cx="5959791" cy="4827694"/>
-          </a:xfrm>
-          <a:effectLst/>
+            <a:off x="5105398" y="1115568"/>
+            <a:ext cx="6245352" cy="4626864"/>
+          </a:xfrm>
         </p:spPr>
         <p:txBody>
           <a:bodyPr anchor="ctr">
@@ -8339,77 +8605,39 @@
           <a:lstStyle/>
           <a:p>
             <a:r>
-              <a:rPr lang="en-GB" dirty="0">
-                <a:solidFill>
-                  <a:schemeClr val="tx1"/>
-                </a:solidFill>
-              </a:rPr>
-              <a:t>PowerPoint presentations</a:t>
-            </a:r>
-          </a:p>
-          <a:p>
-            <a:r>
-              <a:rPr lang="en-GB" dirty="0">
-                <a:solidFill>
-                  <a:schemeClr val="tx1"/>
-                </a:solidFill>
-              </a:rPr>
-              <a:t>Website</a:t>
-            </a:r>
-          </a:p>
-          <a:p>
-            <a:r>
-              <a:rPr lang="en-GB" dirty="0">
-                <a:solidFill>
-                  <a:schemeClr val="tx1"/>
-                </a:solidFill>
-              </a:rPr>
-              <a:t>Game and trailer synopsis</a:t>
-            </a:r>
-          </a:p>
-          <a:p>
-            <a:r>
-              <a:rPr lang="en-GB" dirty="0">
-                <a:solidFill>
-                  <a:schemeClr val="tx1"/>
-                </a:solidFill>
-              </a:rPr>
-              <a:t>Create the design for the speaker and light output</a:t>
-            </a:r>
-          </a:p>
-          <a:p>
-            <a:r>
-              <a:rPr lang="en-GB" dirty="0">
-                <a:solidFill>
-                  <a:schemeClr val="tx1"/>
-                </a:solidFill>
-              </a:rPr>
-              <a:t>Laser cut the board</a:t>
-            </a:r>
-          </a:p>
-          <a:p>
-            <a:r>
-              <a:rPr lang="en-GB" dirty="0">
-                <a:solidFill>
-                  <a:schemeClr val="tx1"/>
-                </a:solidFill>
-              </a:rPr>
-              <a:t>Playtest </a:t>
-            </a:r>
-          </a:p>
-          <a:p>
-            <a:endParaRPr lang="en-NL" dirty="0">
-              <a:solidFill>
-                <a:schemeClr val="tx1"/>
-              </a:solidFill>
-            </a:endParaRPr>
+              <a:rPr lang="en-GB" dirty="0"/>
+              <a:t>Create the controller</a:t>
+            </a:r>
+          </a:p>
+          <a:p>
+            <a:r>
+              <a:rPr lang="en-GB" dirty="0"/>
+              <a:t>Level Design</a:t>
+            </a:r>
+          </a:p>
+          <a:p>
+            <a:r>
+              <a:rPr lang="en-GB" dirty="0"/>
+              <a:t>Electrical </a:t>
+            </a:r>
+            <a:r>
+              <a:rPr lang="en-GB" dirty="0" err="1"/>
+              <a:t>Enginenering</a:t>
+            </a:r>
+            <a:endParaRPr lang="en-GB" dirty="0"/>
+          </a:p>
+          <a:p>
+            <a:endParaRPr lang="en-GB" dirty="0"/>
+          </a:p>
+          <a:p>
+            <a:endParaRPr lang="en-NL" dirty="0"/>
           </a:p>
         </p:txBody>
       </p:sp>
     </p:spTree>
     <p:extLst>
       <p:ext uri="{BB962C8B-B14F-4D97-AF65-F5344CB8AC3E}">
-        <p14:creationId xmlns:p14="http://schemas.microsoft.com/office/powerpoint/2010/main" val="3301650441"/>
+        <p14:creationId xmlns:p14="http://schemas.microsoft.com/office/powerpoint/2010/main" val="852613690"/>
       </p:ext>
     </p:extLst>
   </p:cSld>

</xml_diff>